<commit_message>
work on slides for M2
</commit_message>
<xml_diff>
--- a/slides/M-02-02-Sequences-Quantification.pptx
+++ b/slides/M-02-02-Sequences-Quantification.pptx
@@ -5,14 +5,18 @@
     <p:sldMasterId id="2147483649" r:id="rId1"/>
   </p:sldMasterIdLst>
   <p:notesMasterIdLst>
-    <p:notesMasterId r:id="rId4"/>
+    <p:notesMasterId r:id="rId8"/>
   </p:notesMasterIdLst>
   <p:handoutMasterIdLst>
-    <p:handoutMasterId r:id="rId5"/>
+    <p:handoutMasterId r:id="rId9"/>
   </p:handoutMasterIdLst>
   <p:sldIdLst>
     <p:sldId id="258" r:id="rId2"/>
     <p:sldId id="1911" r:id="rId3"/>
+    <p:sldId id="1912" r:id="rId4"/>
+    <p:sldId id="1913" r:id="rId5"/>
+    <p:sldId id="1914" r:id="rId6"/>
+    <p:sldId id="1915" r:id="rId7"/>
   </p:sldIdLst>
   <p:sldSz cx="9144000" cy="6858000" type="screen4x3"/>
   <p:notesSz cx="6858000" cy="9144000"/>
@@ -1131,6 +1135,722 @@
     <p:extLst>
       <p:ext uri="{BB962C8B-B14F-4D97-AF65-F5344CB8AC3E}">
         <p14:creationId xmlns:p14="http://schemas.microsoft.com/office/powerpoint/2010/main" val="2787644252"/>
+      </p:ext>
+    </p:extLst>
+  </p:cSld>
+  <p:clrMapOvr>
+    <a:masterClrMapping/>
+  </p:clrMapOvr>
+</p:notes>
+</file>
+
+<file path=ppt/notesSlides/notesSlide3.xml><?xml version="1.0" encoding="utf-8"?>
+<p:notes xmlns:a="http://schemas.openxmlformats.org/drawingml/2006/main" xmlns:r="http://schemas.openxmlformats.org/officeDocument/2006/relationships" xmlns:p="http://schemas.openxmlformats.org/presentationml/2006/main">
+  <p:cSld>
+    <p:spTree>
+      <p:nvGrpSpPr>
+        <p:cNvPr id="1" name="">
+          <a:extLst>
+            <a:ext uri="{FF2B5EF4-FFF2-40B4-BE49-F238E27FC236}">
+              <a16:creationId xmlns:a16="http://schemas.microsoft.com/office/drawing/2014/main" id="{BABBEC7C-7CA6-972B-684C-03436ED1FEED}"/>
+            </a:ext>
+          </a:extLst>
+        </p:cNvPr>
+        <p:cNvGrpSpPr/>
+        <p:nvPr/>
+      </p:nvGrpSpPr>
+      <p:grpSpPr>
+        <a:xfrm>
+          <a:off x="0" y="0"/>
+          <a:ext cx="0" cy="0"/>
+          <a:chOff x="0" y="0"/>
+          <a:chExt cx="0" cy="0"/>
+        </a:xfrm>
+      </p:grpSpPr>
+      <p:sp>
+        <p:nvSpPr>
+          <p:cNvPr id="2" name="Slide Image Placeholder 1">
+            <a:extLst>
+              <a:ext uri="{FF2B5EF4-FFF2-40B4-BE49-F238E27FC236}">
+                <a16:creationId xmlns:a16="http://schemas.microsoft.com/office/drawing/2014/main" id="{AD4CB415-5227-C42C-654C-6C17EFB67B0B}"/>
+              </a:ext>
+            </a:extLst>
+          </p:cNvPr>
+          <p:cNvSpPr>
+            <a:spLocks noGrp="1" noRot="1" noChangeAspect="1"/>
+          </p:cNvSpPr>
+          <p:nvPr>
+            <p:ph type="sldImg"/>
+          </p:nvPr>
+        </p:nvSpPr>
+        <p:spPr/>
+      </p:sp>
+      <p:sp>
+        <p:nvSpPr>
+          <p:cNvPr id="3" name="Notes Placeholder 2">
+            <a:extLst>
+              <a:ext uri="{FF2B5EF4-FFF2-40B4-BE49-F238E27FC236}">
+                <a16:creationId xmlns:a16="http://schemas.microsoft.com/office/drawing/2014/main" id="{A31C9CE4-AD18-24C7-0C80-ADBC813CCA20}"/>
+              </a:ext>
+            </a:extLst>
+          </p:cNvPr>
+          <p:cNvSpPr>
+            <a:spLocks noGrp="1"/>
+          </p:cNvSpPr>
+          <p:nvPr>
+            <p:ph type="body" idx="1"/>
+          </p:nvPr>
+        </p:nvSpPr>
+        <p:spPr/>
+        <p:txBody>
+          <a:bodyPr/>
+          <a:lstStyle/>
+          <a:p>
+            <a:r>
+              <a:rPr lang="en-US" dirty="0">
+                <a:latin typeface="Tahoma" panose="020B0604030504040204" pitchFamily="34" charset="0"/>
+                <a:ea typeface="Tahoma" panose="020B0604030504040204" pitchFamily="34" charset="0"/>
+                <a:cs typeface="Tahoma" panose="020B0604030504040204" pitchFamily="34" charset="0"/>
+              </a:rPr>
+              <a:t>The framework that we will be using for this work is HAMR -- a model-driven development tool chain for high assurance embedded systems that emphasizes three layers of development:</a:t>
+            </a:r>
+          </a:p>
+          <a:p>
+            <a:endParaRPr lang="en-US" dirty="0">
+              <a:latin typeface="Tahoma" panose="020B0604030504040204" pitchFamily="34" charset="0"/>
+              <a:ea typeface="Tahoma" panose="020B0604030504040204" pitchFamily="34" charset="0"/>
+              <a:cs typeface="Tahoma" panose="020B0604030504040204" pitchFamily="34" charset="0"/>
+            </a:endParaRPr>
+          </a:p>
+          <a:p>
+            <a:r>
+              <a:rPr lang="en-US" dirty="0">
+                <a:latin typeface="Tahoma" panose="020B0604030504040204" pitchFamily="34" charset="0"/>
+                <a:ea typeface="Tahoma" panose="020B0604030504040204" pitchFamily="34" charset="0"/>
+                <a:cs typeface="Tahoma" panose="020B0604030504040204" pitchFamily="34" charset="0"/>
+              </a:rPr>
+              <a:t>Modeling, analysis and verification in the AADL modeling language, leveraging many tools in the AADL ecosystem</a:t>
+            </a:r>
+          </a:p>
+          <a:p>
+            <a:endParaRPr lang="en-US" dirty="0">
+              <a:latin typeface="Tahoma" panose="020B0604030504040204" pitchFamily="34" charset="0"/>
+              <a:ea typeface="Tahoma" panose="020B0604030504040204" pitchFamily="34" charset="0"/>
+              <a:cs typeface="Tahoma" panose="020B0604030504040204" pitchFamily="34" charset="0"/>
+            </a:endParaRPr>
+          </a:p>
+          <a:p>
+            <a:r>
+              <a:rPr lang="en-US" dirty="0">
+                <a:latin typeface="Tahoma" panose="020B0604030504040204" pitchFamily="34" charset="0"/>
+                <a:ea typeface="Tahoma" panose="020B0604030504040204" pitchFamily="34" charset="0"/>
+                <a:cs typeface="Tahoma" panose="020B0604030504040204" pitchFamily="34" charset="0"/>
+              </a:rPr>
+              <a:t>Development of component application logic in multiple languages include C and Slang (a safety-critical system of Scala with a contract verification framework, which can be translated to C)</a:t>
+            </a:r>
+          </a:p>
+          <a:p>
+            <a:endParaRPr lang="en-US" dirty="0">
+              <a:latin typeface="Tahoma" panose="020B0604030504040204" pitchFamily="34" charset="0"/>
+              <a:ea typeface="Tahoma" panose="020B0604030504040204" pitchFamily="34" charset="0"/>
+              <a:cs typeface="Tahoma" panose="020B0604030504040204" pitchFamily="34" charset="0"/>
+            </a:endParaRPr>
+          </a:p>
+          <a:p>
+            <a:r>
+              <a:rPr lang="en-US" dirty="0">
+                <a:latin typeface="Tahoma" panose="020B0604030504040204" pitchFamily="34" charset="0"/>
+                <a:ea typeface="Tahoma" panose="020B0604030504040204" pitchFamily="34" charset="0"/>
+                <a:cs typeface="Tahoma" panose="020B0604030504040204" pitchFamily="34" charset="0"/>
+              </a:rPr>
+              <a:t>Deployments on multiple platforms including seL4 verified microkernel.</a:t>
+            </a:r>
+          </a:p>
+          <a:p>
+            <a:endParaRPr lang="en-US" dirty="0">
+              <a:latin typeface="Tahoma" panose="020B0604030504040204" pitchFamily="34" charset="0"/>
+              <a:ea typeface="Tahoma" panose="020B0604030504040204" pitchFamily="34" charset="0"/>
+              <a:cs typeface="Tahoma" panose="020B0604030504040204" pitchFamily="34" charset="0"/>
+            </a:endParaRPr>
+          </a:p>
+        </p:txBody>
+      </p:sp>
+      <p:sp>
+        <p:nvSpPr>
+          <p:cNvPr id="4" name="Slide Number Placeholder 3">
+            <a:extLst>
+              <a:ext uri="{FF2B5EF4-FFF2-40B4-BE49-F238E27FC236}">
+                <a16:creationId xmlns:a16="http://schemas.microsoft.com/office/drawing/2014/main" id="{A02B9BF3-AE2B-0245-FB05-8751471C4124}"/>
+              </a:ext>
+            </a:extLst>
+          </p:cNvPr>
+          <p:cNvSpPr>
+            <a:spLocks noGrp="1"/>
+          </p:cNvSpPr>
+          <p:nvPr>
+            <p:ph type="sldNum" sz="quarter" idx="5"/>
+          </p:nvPr>
+        </p:nvSpPr>
+        <p:spPr/>
+        <p:txBody>
+          <a:bodyPr/>
+          <a:lstStyle/>
+          <a:p>
+            <a:pPr>
+              <a:defRPr/>
+            </a:pPr>
+            <a:fld id="{2BFE2475-28EF-9A44-97D3-D2287C00B1B1}" type="slidenum">
+              <a:rPr lang="en-US" smtClean="0"/>
+              <a:pPr>
+                <a:defRPr/>
+              </a:pPr>
+              <a:t>3</a:t>
+            </a:fld>
+            <a:endParaRPr lang="en-US"/>
+          </a:p>
+        </p:txBody>
+      </p:sp>
+    </p:spTree>
+    <p:extLst>
+      <p:ext uri="{BB962C8B-B14F-4D97-AF65-F5344CB8AC3E}">
+        <p14:creationId xmlns:p14="http://schemas.microsoft.com/office/powerpoint/2010/main" val="2873205510"/>
+      </p:ext>
+    </p:extLst>
+  </p:cSld>
+  <p:clrMapOvr>
+    <a:masterClrMapping/>
+  </p:clrMapOvr>
+</p:notes>
+</file>
+
+<file path=ppt/notesSlides/notesSlide4.xml><?xml version="1.0" encoding="utf-8"?>
+<p:notes xmlns:a="http://schemas.openxmlformats.org/drawingml/2006/main" xmlns:r="http://schemas.openxmlformats.org/officeDocument/2006/relationships" xmlns:p="http://schemas.openxmlformats.org/presentationml/2006/main">
+  <p:cSld>
+    <p:spTree>
+      <p:nvGrpSpPr>
+        <p:cNvPr id="1" name="">
+          <a:extLst>
+            <a:ext uri="{FF2B5EF4-FFF2-40B4-BE49-F238E27FC236}">
+              <a16:creationId xmlns:a16="http://schemas.microsoft.com/office/drawing/2014/main" id="{C3D4FB06-304D-73A4-BB00-A8976CC94F0B}"/>
+            </a:ext>
+          </a:extLst>
+        </p:cNvPr>
+        <p:cNvGrpSpPr/>
+        <p:nvPr/>
+      </p:nvGrpSpPr>
+      <p:grpSpPr>
+        <a:xfrm>
+          <a:off x="0" y="0"/>
+          <a:ext cx="0" cy="0"/>
+          <a:chOff x="0" y="0"/>
+          <a:chExt cx="0" cy="0"/>
+        </a:xfrm>
+      </p:grpSpPr>
+      <p:sp>
+        <p:nvSpPr>
+          <p:cNvPr id="2" name="Slide Image Placeholder 1">
+            <a:extLst>
+              <a:ext uri="{FF2B5EF4-FFF2-40B4-BE49-F238E27FC236}">
+                <a16:creationId xmlns:a16="http://schemas.microsoft.com/office/drawing/2014/main" id="{491650FF-9602-0085-4D83-169C80151C81}"/>
+              </a:ext>
+            </a:extLst>
+          </p:cNvPr>
+          <p:cNvSpPr>
+            <a:spLocks noGrp="1" noRot="1" noChangeAspect="1"/>
+          </p:cNvSpPr>
+          <p:nvPr>
+            <p:ph type="sldImg"/>
+          </p:nvPr>
+        </p:nvSpPr>
+        <p:spPr/>
+      </p:sp>
+      <p:sp>
+        <p:nvSpPr>
+          <p:cNvPr id="3" name="Notes Placeholder 2">
+            <a:extLst>
+              <a:ext uri="{FF2B5EF4-FFF2-40B4-BE49-F238E27FC236}">
+                <a16:creationId xmlns:a16="http://schemas.microsoft.com/office/drawing/2014/main" id="{59C4018F-D084-9F80-0B6E-9177C0F09044}"/>
+              </a:ext>
+            </a:extLst>
+          </p:cNvPr>
+          <p:cNvSpPr>
+            <a:spLocks noGrp="1"/>
+          </p:cNvSpPr>
+          <p:nvPr>
+            <p:ph type="body" idx="1"/>
+          </p:nvPr>
+        </p:nvSpPr>
+        <p:spPr/>
+        <p:txBody>
+          <a:bodyPr/>
+          <a:lstStyle/>
+          <a:p>
+            <a:r>
+              <a:rPr lang="en-US" dirty="0">
+                <a:latin typeface="Tahoma" panose="020B0604030504040204" pitchFamily="34" charset="0"/>
+                <a:ea typeface="Tahoma" panose="020B0604030504040204" pitchFamily="34" charset="0"/>
+                <a:cs typeface="Tahoma" panose="020B0604030504040204" pitchFamily="34" charset="0"/>
+              </a:rPr>
+              <a:t>The framework that we will be using for this work is HAMR -- a model-driven development tool chain for high assurance embedded systems that emphasizes three layers of development:</a:t>
+            </a:r>
+          </a:p>
+          <a:p>
+            <a:endParaRPr lang="en-US" dirty="0">
+              <a:latin typeface="Tahoma" panose="020B0604030504040204" pitchFamily="34" charset="0"/>
+              <a:ea typeface="Tahoma" panose="020B0604030504040204" pitchFamily="34" charset="0"/>
+              <a:cs typeface="Tahoma" panose="020B0604030504040204" pitchFamily="34" charset="0"/>
+            </a:endParaRPr>
+          </a:p>
+          <a:p>
+            <a:r>
+              <a:rPr lang="en-US" dirty="0">
+                <a:latin typeface="Tahoma" panose="020B0604030504040204" pitchFamily="34" charset="0"/>
+                <a:ea typeface="Tahoma" panose="020B0604030504040204" pitchFamily="34" charset="0"/>
+                <a:cs typeface="Tahoma" panose="020B0604030504040204" pitchFamily="34" charset="0"/>
+              </a:rPr>
+              <a:t>Modeling, analysis and verification in the AADL modeling language, leveraging many tools in the AADL ecosystem</a:t>
+            </a:r>
+          </a:p>
+          <a:p>
+            <a:endParaRPr lang="en-US" dirty="0">
+              <a:latin typeface="Tahoma" panose="020B0604030504040204" pitchFamily="34" charset="0"/>
+              <a:ea typeface="Tahoma" panose="020B0604030504040204" pitchFamily="34" charset="0"/>
+              <a:cs typeface="Tahoma" panose="020B0604030504040204" pitchFamily="34" charset="0"/>
+            </a:endParaRPr>
+          </a:p>
+          <a:p>
+            <a:r>
+              <a:rPr lang="en-US" dirty="0">
+                <a:latin typeface="Tahoma" panose="020B0604030504040204" pitchFamily="34" charset="0"/>
+                <a:ea typeface="Tahoma" panose="020B0604030504040204" pitchFamily="34" charset="0"/>
+                <a:cs typeface="Tahoma" panose="020B0604030504040204" pitchFamily="34" charset="0"/>
+              </a:rPr>
+              <a:t>Development of component application logic in multiple languages include C and Slang (a safety-critical system of Scala with a contract verification framework, which can be translated to C)</a:t>
+            </a:r>
+          </a:p>
+          <a:p>
+            <a:endParaRPr lang="en-US" dirty="0">
+              <a:latin typeface="Tahoma" panose="020B0604030504040204" pitchFamily="34" charset="0"/>
+              <a:ea typeface="Tahoma" panose="020B0604030504040204" pitchFamily="34" charset="0"/>
+              <a:cs typeface="Tahoma" panose="020B0604030504040204" pitchFamily="34" charset="0"/>
+            </a:endParaRPr>
+          </a:p>
+          <a:p>
+            <a:r>
+              <a:rPr lang="en-US" dirty="0">
+                <a:latin typeface="Tahoma" panose="020B0604030504040204" pitchFamily="34" charset="0"/>
+                <a:ea typeface="Tahoma" panose="020B0604030504040204" pitchFamily="34" charset="0"/>
+                <a:cs typeface="Tahoma" panose="020B0604030504040204" pitchFamily="34" charset="0"/>
+              </a:rPr>
+              <a:t>Deployments on multiple platforms including seL4 verified microkernel.</a:t>
+            </a:r>
+          </a:p>
+          <a:p>
+            <a:endParaRPr lang="en-US" dirty="0">
+              <a:latin typeface="Tahoma" panose="020B0604030504040204" pitchFamily="34" charset="0"/>
+              <a:ea typeface="Tahoma" panose="020B0604030504040204" pitchFamily="34" charset="0"/>
+              <a:cs typeface="Tahoma" panose="020B0604030504040204" pitchFamily="34" charset="0"/>
+            </a:endParaRPr>
+          </a:p>
+        </p:txBody>
+      </p:sp>
+      <p:sp>
+        <p:nvSpPr>
+          <p:cNvPr id="4" name="Slide Number Placeholder 3">
+            <a:extLst>
+              <a:ext uri="{FF2B5EF4-FFF2-40B4-BE49-F238E27FC236}">
+                <a16:creationId xmlns:a16="http://schemas.microsoft.com/office/drawing/2014/main" id="{040727B0-7430-FC3B-2B7D-833269DF344A}"/>
+              </a:ext>
+            </a:extLst>
+          </p:cNvPr>
+          <p:cNvSpPr>
+            <a:spLocks noGrp="1"/>
+          </p:cNvSpPr>
+          <p:nvPr>
+            <p:ph type="sldNum" sz="quarter" idx="5"/>
+          </p:nvPr>
+        </p:nvSpPr>
+        <p:spPr/>
+        <p:txBody>
+          <a:bodyPr/>
+          <a:lstStyle/>
+          <a:p>
+            <a:pPr>
+              <a:defRPr/>
+            </a:pPr>
+            <a:fld id="{2BFE2475-28EF-9A44-97D3-D2287C00B1B1}" type="slidenum">
+              <a:rPr lang="en-US" smtClean="0"/>
+              <a:pPr>
+                <a:defRPr/>
+              </a:pPr>
+              <a:t>4</a:t>
+            </a:fld>
+            <a:endParaRPr lang="en-US"/>
+          </a:p>
+        </p:txBody>
+      </p:sp>
+    </p:spTree>
+    <p:extLst>
+      <p:ext uri="{BB962C8B-B14F-4D97-AF65-F5344CB8AC3E}">
+        <p14:creationId xmlns:p14="http://schemas.microsoft.com/office/powerpoint/2010/main" val="1692737993"/>
+      </p:ext>
+    </p:extLst>
+  </p:cSld>
+  <p:clrMapOvr>
+    <a:masterClrMapping/>
+  </p:clrMapOvr>
+</p:notes>
+</file>
+
+<file path=ppt/notesSlides/notesSlide5.xml><?xml version="1.0" encoding="utf-8"?>
+<p:notes xmlns:a="http://schemas.openxmlformats.org/drawingml/2006/main" xmlns:r="http://schemas.openxmlformats.org/officeDocument/2006/relationships" xmlns:p="http://schemas.openxmlformats.org/presentationml/2006/main">
+  <p:cSld>
+    <p:spTree>
+      <p:nvGrpSpPr>
+        <p:cNvPr id="1" name="">
+          <a:extLst>
+            <a:ext uri="{FF2B5EF4-FFF2-40B4-BE49-F238E27FC236}">
+              <a16:creationId xmlns:a16="http://schemas.microsoft.com/office/drawing/2014/main" id="{0AC9C058-267D-E10D-237A-D0B37A547759}"/>
+            </a:ext>
+          </a:extLst>
+        </p:cNvPr>
+        <p:cNvGrpSpPr/>
+        <p:nvPr/>
+      </p:nvGrpSpPr>
+      <p:grpSpPr>
+        <a:xfrm>
+          <a:off x="0" y="0"/>
+          <a:ext cx="0" cy="0"/>
+          <a:chOff x="0" y="0"/>
+          <a:chExt cx="0" cy="0"/>
+        </a:xfrm>
+      </p:grpSpPr>
+      <p:sp>
+        <p:nvSpPr>
+          <p:cNvPr id="2" name="Slide Image Placeholder 1">
+            <a:extLst>
+              <a:ext uri="{FF2B5EF4-FFF2-40B4-BE49-F238E27FC236}">
+                <a16:creationId xmlns:a16="http://schemas.microsoft.com/office/drawing/2014/main" id="{5296286C-5C66-AA2D-5240-F64F6BD9580F}"/>
+              </a:ext>
+            </a:extLst>
+          </p:cNvPr>
+          <p:cNvSpPr>
+            <a:spLocks noGrp="1" noRot="1" noChangeAspect="1"/>
+          </p:cNvSpPr>
+          <p:nvPr>
+            <p:ph type="sldImg"/>
+          </p:nvPr>
+        </p:nvSpPr>
+        <p:spPr/>
+      </p:sp>
+      <p:sp>
+        <p:nvSpPr>
+          <p:cNvPr id="3" name="Notes Placeholder 2">
+            <a:extLst>
+              <a:ext uri="{FF2B5EF4-FFF2-40B4-BE49-F238E27FC236}">
+                <a16:creationId xmlns:a16="http://schemas.microsoft.com/office/drawing/2014/main" id="{D35972C2-073A-BD6F-EDA6-B01FCC94ECC8}"/>
+              </a:ext>
+            </a:extLst>
+          </p:cNvPr>
+          <p:cNvSpPr>
+            <a:spLocks noGrp="1"/>
+          </p:cNvSpPr>
+          <p:nvPr>
+            <p:ph type="body" idx="1"/>
+          </p:nvPr>
+        </p:nvSpPr>
+        <p:spPr/>
+        <p:txBody>
+          <a:bodyPr/>
+          <a:lstStyle/>
+          <a:p>
+            <a:r>
+              <a:rPr lang="en-US" dirty="0">
+                <a:latin typeface="Tahoma" panose="020B0604030504040204" pitchFamily="34" charset="0"/>
+                <a:ea typeface="Tahoma" panose="020B0604030504040204" pitchFamily="34" charset="0"/>
+                <a:cs typeface="Tahoma" panose="020B0604030504040204" pitchFamily="34" charset="0"/>
+              </a:rPr>
+              <a:t>The framework that we will be using for this work is HAMR -- a model-driven development tool chain for high assurance embedded systems that emphasizes three layers of development:</a:t>
+            </a:r>
+          </a:p>
+          <a:p>
+            <a:endParaRPr lang="en-US" dirty="0">
+              <a:latin typeface="Tahoma" panose="020B0604030504040204" pitchFamily="34" charset="0"/>
+              <a:ea typeface="Tahoma" panose="020B0604030504040204" pitchFamily="34" charset="0"/>
+              <a:cs typeface="Tahoma" panose="020B0604030504040204" pitchFamily="34" charset="0"/>
+            </a:endParaRPr>
+          </a:p>
+          <a:p>
+            <a:r>
+              <a:rPr lang="en-US" dirty="0">
+                <a:latin typeface="Tahoma" panose="020B0604030504040204" pitchFamily="34" charset="0"/>
+                <a:ea typeface="Tahoma" panose="020B0604030504040204" pitchFamily="34" charset="0"/>
+                <a:cs typeface="Tahoma" panose="020B0604030504040204" pitchFamily="34" charset="0"/>
+              </a:rPr>
+              <a:t>Modeling, analysis and verification in the AADL modeling language, leveraging many tools in the AADL ecosystem</a:t>
+            </a:r>
+          </a:p>
+          <a:p>
+            <a:endParaRPr lang="en-US" dirty="0">
+              <a:latin typeface="Tahoma" panose="020B0604030504040204" pitchFamily="34" charset="0"/>
+              <a:ea typeface="Tahoma" panose="020B0604030504040204" pitchFamily="34" charset="0"/>
+              <a:cs typeface="Tahoma" panose="020B0604030504040204" pitchFamily="34" charset="0"/>
+            </a:endParaRPr>
+          </a:p>
+          <a:p>
+            <a:r>
+              <a:rPr lang="en-US" dirty="0">
+                <a:latin typeface="Tahoma" panose="020B0604030504040204" pitchFamily="34" charset="0"/>
+                <a:ea typeface="Tahoma" panose="020B0604030504040204" pitchFamily="34" charset="0"/>
+                <a:cs typeface="Tahoma" panose="020B0604030504040204" pitchFamily="34" charset="0"/>
+              </a:rPr>
+              <a:t>Development of component application logic in multiple languages include C and Slang (a safety-critical system of Scala with a contract verification framework, which can be translated to C)</a:t>
+            </a:r>
+          </a:p>
+          <a:p>
+            <a:endParaRPr lang="en-US" dirty="0">
+              <a:latin typeface="Tahoma" panose="020B0604030504040204" pitchFamily="34" charset="0"/>
+              <a:ea typeface="Tahoma" panose="020B0604030504040204" pitchFamily="34" charset="0"/>
+              <a:cs typeface="Tahoma" panose="020B0604030504040204" pitchFamily="34" charset="0"/>
+            </a:endParaRPr>
+          </a:p>
+          <a:p>
+            <a:r>
+              <a:rPr lang="en-US" dirty="0">
+                <a:latin typeface="Tahoma" panose="020B0604030504040204" pitchFamily="34" charset="0"/>
+                <a:ea typeface="Tahoma" panose="020B0604030504040204" pitchFamily="34" charset="0"/>
+                <a:cs typeface="Tahoma" panose="020B0604030504040204" pitchFamily="34" charset="0"/>
+              </a:rPr>
+              <a:t>Deployments on multiple platforms including seL4 verified microkernel.</a:t>
+            </a:r>
+          </a:p>
+          <a:p>
+            <a:endParaRPr lang="en-US" dirty="0">
+              <a:latin typeface="Tahoma" panose="020B0604030504040204" pitchFamily="34" charset="0"/>
+              <a:ea typeface="Tahoma" panose="020B0604030504040204" pitchFamily="34" charset="0"/>
+              <a:cs typeface="Tahoma" panose="020B0604030504040204" pitchFamily="34" charset="0"/>
+            </a:endParaRPr>
+          </a:p>
+        </p:txBody>
+      </p:sp>
+      <p:sp>
+        <p:nvSpPr>
+          <p:cNvPr id="4" name="Slide Number Placeholder 3">
+            <a:extLst>
+              <a:ext uri="{FF2B5EF4-FFF2-40B4-BE49-F238E27FC236}">
+                <a16:creationId xmlns:a16="http://schemas.microsoft.com/office/drawing/2014/main" id="{5CD93305-AF97-DCCE-F8DF-BA289A6FB4D2}"/>
+              </a:ext>
+            </a:extLst>
+          </p:cNvPr>
+          <p:cNvSpPr>
+            <a:spLocks noGrp="1"/>
+          </p:cNvSpPr>
+          <p:nvPr>
+            <p:ph type="sldNum" sz="quarter" idx="5"/>
+          </p:nvPr>
+        </p:nvSpPr>
+        <p:spPr/>
+        <p:txBody>
+          <a:bodyPr/>
+          <a:lstStyle/>
+          <a:p>
+            <a:pPr>
+              <a:defRPr/>
+            </a:pPr>
+            <a:fld id="{2BFE2475-28EF-9A44-97D3-D2287C00B1B1}" type="slidenum">
+              <a:rPr lang="en-US" smtClean="0"/>
+              <a:pPr>
+                <a:defRPr/>
+              </a:pPr>
+              <a:t>5</a:t>
+            </a:fld>
+            <a:endParaRPr lang="en-US"/>
+          </a:p>
+        </p:txBody>
+      </p:sp>
+    </p:spTree>
+    <p:extLst>
+      <p:ext uri="{BB962C8B-B14F-4D97-AF65-F5344CB8AC3E}">
+        <p14:creationId xmlns:p14="http://schemas.microsoft.com/office/powerpoint/2010/main" val="3617639852"/>
+      </p:ext>
+    </p:extLst>
+  </p:cSld>
+  <p:clrMapOvr>
+    <a:masterClrMapping/>
+  </p:clrMapOvr>
+</p:notes>
+</file>
+
+<file path=ppt/notesSlides/notesSlide6.xml><?xml version="1.0" encoding="utf-8"?>
+<p:notes xmlns:a="http://schemas.openxmlformats.org/drawingml/2006/main" xmlns:r="http://schemas.openxmlformats.org/officeDocument/2006/relationships" xmlns:p="http://schemas.openxmlformats.org/presentationml/2006/main">
+  <p:cSld>
+    <p:spTree>
+      <p:nvGrpSpPr>
+        <p:cNvPr id="1" name="">
+          <a:extLst>
+            <a:ext uri="{FF2B5EF4-FFF2-40B4-BE49-F238E27FC236}">
+              <a16:creationId xmlns:a16="http://schemas.microsoft.com/office/drawing/2014/main" id="{5DC92C09-4926-C796-F227-95F49271DFE7}"/>
+            </a:ext>
+          </a:extLst>
+        </p:cNvPr>
+        <p:cNvGrpSpPr/>
+        <p:nvPr/>
+      </p:nvGrpSpPr>
+      <p:grpSpPr>
+        <a:xfrm>
+          <a:off x="0" y="0"/>
+          <a:ext cx="0" cy="0"/>
+          <a:chOff x="0" y="0"/>
+          <a:chExt cx="0" cy="0"/>
+        </a:xfrm>
+      </p:grpSpPr>
+      <p:sp>
+        <p:nvSpPr>
+          <p:cNvPr id="2" name="Slide Image Placeholder 1">
+            <a:extLst>
+              <a:ext uri="{FF2B5EF4-FFF2-40B4-BE49-F238E27FC236}">
+                <a16:creationId xmlns:a16="http://schemas.microsoft.com/office/drawing/2014/main" id="{9C422695-C1B9-8D11-6AF3-C585FAA354E8}"/>
+              </a:ext>
+            </a:extLst>
+          </p:cNvPr>
+          <p:cNvSpPr>
+            <a:spLocks noGrp="1" noRot="1" noChangeAspect="1"/>
+          </p:cNvSpPr>
+          <p:nvPr>
+            <p:ph type="sldImg"/>
+          </p:nvPr>
+        </p:nvSpPr>
+        <p:spPr/>
+      </p:sp>
+      <p:sp>
+        <p:nvSpPr>
+          <p:cNvPr id="3" name="Notes Placeholder 2">
+            <a:extLst>
+              <a:ext uri="{FF2B5EF4-FFF2-40B4-BE49-F238E27FC236}">
+                <a16:creationId xmlns:a16="http://schemas.microsoft.com/office/drawing/2014/main" id="{DF8FFC7A-032F-7575-9E56-4792092985E7}"/>
+              </a:ext>
+            </a:extLst>
+          </p:cNvPr>
+          <p:cNvSpPr>
+            <a:spLocks noGrp="1"/>
+          </p:cNvSpPr>
+          <p:nvPr>
+            <p:ph type="body" idx="1"/>
+          </p:nvPr>
+        </p:nvSpPr>
+        <p:spPr/>
+        <p:txBody>
+          <a:bodyPr/>
+          <a:lstStyle/>
+          <a:p>
+            <a:r>
+              <a:rPr lang="en-US" dirty="0">
+                <a:latin typeface="Tahoma" panose="020B0604030504040204" pitchFamily="34" charset="0"/>
+                <a:ea typeface="Tahoma" panose="020B0604030504040204" pitchFamily="34" charset="0"/>
+                <a:cs typeface="Tahoma" panose="020B0604030504040204" pitchFamily="34" charset="0"/>
+              </a:rPr>
+              <a:t>The framework that we will be using for this work is HAMR -- a model-driven development tool chain for high assurance embedded systems that emphasizes three layers of development:</a:t>
+            </a:r>
+          </a:p>
+          <a:p>
+            <a:endParaRPr lang="en-US" dirty="0">
+              <a:latin typeface="Tahoma" panose="020B0604030504040204" pitchFamily="34" charset="0"/>
+              <a:ea typeface="Tahoma" panose="020B0604030504040204" pitchFamily="34" charset="0"/>
+              <a:cs typeface="Tahoma" panose="020B0604030504040204" pitchFamily="34" charset="0"/>
+            </a:endParaRPr>
+          </a:p>
+          <a:p>
+            <a:r>
+              <a:rPr lang="en-US" dirty="0">
+                <a:latin typeface="Tahoma" panose="020B0604030504040204" pitchFamily="34" charset="0"/>
+                <a:ea typeface="Tahoma" panose="020B0604030504040204" pitchFamily="34" charset="0"/>
+                <a:cs typeface="Tahoma" panose="020B0604030504040204" pitchFamily="34" charset="0"/>
+              </a:rPr>
+              <a:t>Modeling, analysis and verification in the AADL modeling language, leveraging many tools in the AADL ecosystem</a:t>
+            </a:r>
+          </a:p>
+          <a:p>
+            <a:endParaRPr lang="en-US" dirty="0">
+              <a:latin typeface="Tahoma" panose="020B0604030504040204" pitchFamily="34" charset="0"/>
+              <a:ea typeface="Tahoma" panose="020B0604030504040204" pitchFamily="34" charset="0"/>
+              <a:cs typeface="Tahoma" panose="020B0604030504040204" pitchFamily="34" charset="0"/>
+            </a:endParaRPr>
+          </a:p>
+          <a:p>
+            <a:r>
+              <a:rPr lang="en-US" dirty="0">
+                <a:latin typeface="Tahoma" panose="020B0604030504040204" pitchFamily="34" charset="0"/>
+                <a:ea typeface="Tahoma" panose="020B0604030504040204" pitchFamily="34" charset="0"/>
+                <a:cs typeface="Tahoma" panose="020B0604030504040204" pitchFamily="34" charset="0"/>
+              </a:rPr>
+              <a:t>Development of component application logic in multiple languages include C and Slang (a safety-critical system of Scala with a contract verification framework, which can be translated to C)</a:t>
+            </a:r>
+          </a:p>
+          <a:p>
+            <a:endParaRPr lang="en-US" dirty="0">
+              <a:latin typeface="Tahoma" panose="020B0604030504040204" pitchFamily="34" charset="0"/>
+              <a:ea typeface="Tahoma" panose="020B0604030504040204" pitchFamily="34" charset="0"/>
+              <a:cs typeface="Tahoma" panose="020B0604030504040204" pitchFamily="34" charset="0"/>
+            </a:endParaRPr>
+          </a:p>
+          <a:p>
+            <a:r>
+              <a:rPr lang="en-US" dirty="0">
+                <a:latin typeface="Tahoma" panose="020B0604030504040204" pitchFamily="34" charset="0"/>
+                <a:ea typeface="Tahoma" panose="020B0604030504040204" pitchFamily="34" charset="0"/>
+                <a:cs typeface="Tahoma" panose="020B0604030504040204" pitchFamily="34" charset="0"/>
+              </a:rPr>
+              <a:t>Deployments on multiple platforms including seL4 verified microkernel.</a:t>
+            </a:r>
+          </a:p>
+          <a:p>
+            <a:endParaRPr lang="en-US" dirty="0">
+              <a:latin typeface="Tahoma" panose="020B0604030504040204" pitchFamily="34" charset="0"/>
+              <a:ea typeface="Tahoma" panose="020B0604030504040204" pitchFamily="34" charset="0"/>
+              <a:cs typeface="Tahoma" panose="020B0604030504040204" pitchFamily="34" charset="0"/>
+            </a:endParaRPr>
+          </a:p>
+        </p:txBody>
+      </p:sp>
+      <p:sp>
+        <p:nvSpPr>
+          <p:cNvPr id="4" name="Slide Number Placeholder 3">
+            <a:extLst>
+              <a:ext uri="{FF2B5EF4-FFF2-40B4-BE49-F238E27FC236}">
+                <a16:creationId xmlns:a16="http://schemas.microsoft.com/office/drawing/2014/main" id="{AFFA2E76-7C3A-29C5-EB1C-412896847731}"/>
+              </a:ext>
+            </a:extLst>
+          </p:cNvPr>
+          <p:cNvSpPr>
+            <a:spLocks noGrp="1"/>
+          </p:cNvSpPr>
+          <p:nvPr>
+            <p:ph type="sldNum" sz="quarter" idx="5"/>
+          </p:nvPr>
+        </p:nvSpPr>
+        <p:spPr/>
+        <p:txBody>
+          <a:bodyPr/>
+          <a:lstStyle/>
+          <a:p>
+            <a:pPr>
+              <a:defRPr/>
+            </a:pPr>
+            <a:fld id="{2BFE2475-28EF-9A44-97D3-D2287C00B1B1}" type="slidenum">
+              <a:rPr lang="en-US" smtClean="0"/>
+              <a:pPr>
+                <a:defRPr/>
+              </a:pPr>
+              <a:t>6</a:t>
+            </a:fld>
+            <a:endParaRPr lang="en-US"/>
+          </a:p>
+        </p:txBody>
+      </p:sp>
+    </p:spTree>
+    <p:extLst>
+      <p:ext uri="{BB962C8B-B14F-4D97-AF65-F5344CB8AC3E}">
+        <p14:creationId xmlns:p14="http://schemas.microsoft.com/office/powerpoint/2010/main" val="768381816"/>
       </p:ext>
     </p:extLst>
   </p:cSld>
@@ -4953,10 +5673,2655 @@
           </a:p>
         </p:txBody>
       </p:sp>
+      <p:graphicFrame>
+        <p:nvGraphicFramePr>
+          <p:cNvPr id="5" name="Table 4">
+            <a:extLst>
+              <a:ext uri="{FF2B5EF4-FFF2-40B4-BE49-F238E27FC236}">
+                <a16:creationId xmlns:a16="http://schemas.microsoft.com/office/drawing/2014/main" id="{BE68A2B2-1DAA-92F3-B34C-9AF37C483334}"/>
+              </a:ext>
+            </a:extLst>
+          </p:cNvPr>
+          <p:cNvGraphicFramePr>
+            <a:graphicFrameLocks noGrp="1"/>
+          </p:cNvGraphicFramePr>
+          <p:nvPr>
+            <p:extLst>
+              <p:ext uri="{D42A27DB-BD31-4B8C-83A1-F6EECF244321}">
+                <p14:modId xmlns:p14="http://schemas.microsoft.com/office/powerpoint/2010/main" val="1609748423"/>
+              </p:ext>
+            </p:extLst>
+          </p:nvPr>
+        </p:nvGraphicFramePr>
+        <p:xfrm>
+          <a:off x="533400" y="1600200"/>
+          <a:ext cx="8153400" cy="4495800"/>
+        </p:xfrm>
+        <a:graphic>
+          <a:graphicData uri="http://schemas.openxmlformats.org/drawingml/2006/table">
+            <a:tbl>
+              <a:tblPr firstRow="1" bandRow="1">
+                <a:tableStyleId>{5C22544A-7EE6-4342-B048-85BDC9FD1C3A}</a:tableStyleId>
+              </a:tblPr>
+              <a:tblGrid>
+                <a:gridCol w="3733800">
+                  <a:extLst>
+                    <a:ext uri="{9D8B030D-6E8A-4147-A177-3AD203B41FA5}">
+                      <a16:colId xmlns:a16="http://schemas.microsoft.com/office/drawing/2014/main" val="175688698"/>
+                    </a:ext>
+                  </a:extLst>
+                </a:gridCol>
+                <a:gridCol w="1676400">
+                  <a:extLst>
+                    <a:ext uri="{9D8B030D-6E8A-4147-A177-3AD203B41FA5}">
+                      <a16:colId xmlns:a16="http://schemas.microsoft.com/office/drawing/2014/main" val="2403061847"/>
+                    </a:ext>
+                  </a:extLst>
+                </a:gridCol>
+                <a:gridCol w="2743200">
+                  <a:extLst>
+                    <a:ext uri="{9D8B030D-6E8A-4147-A177-3AD203B41FA5}">
+                      <a16:colId xmlns:a16="http://schemas.microsoft.com/office/drawing/2014/main" val="2343907239"/>
+                    </a:ext>
+                  </a:extLst>
+                </a:gridCol>
+              </a:tblGrid>
+              <a:tr h="370840">
+                <a:tc>
+                  <a:txBody>
+                    <a:bodyPr/>
+                    <a:lstStyle/>
+                    <a:p>
+                      <a:r>
+                        <a:rPr lang="en-GB" sz="1600" dirty="0">
+                          <a:latin typeface="+mn-lt"/>
+                          <a:ea typeface="Menlo" panose="020B0609030804020204" pitchFamily="49" charset="0"/>
+                          <a:cs typeface="Menlo" panose="020B0609030804020204" pitchFamily="49" charset="0"/>
+                        </a:rPr>
+                        <a:t>Slang</a:t>
+                      </a:r>
+                    </a:p>
+                  </a:txBody>
+                  <a:tcPr/>
+                </a:tc>
+                <a:tc>
+                  <a:txBody>
+                    <a:bodyPr/>
+                    <a:lstStyle/>
+                    <a:p>
+                      <a:r>
+                        <a:rPr lang="en-GB" sz="1600" dirty="0">
+                          <a:latin typeface="+mn-lt"/>
+                          <a:ea typeface="Menlo" panose="020B0609030804020204" pitchFamily="49" charset="0"/>
+                          <a:cs typeface="Menlo" panose="020B0609030804020204" pitchFamily="49" charset="0"/>
+                        </a:rPr>
+                        <a:t>Explanation</a:t>
+                      </a:r>
+                    </a:p>
+                  </a:txBody>
+                  <a:tcPr/>
+                </a:tc>
+                <a:tc>
+                  <a:txBody>
+                    <a:bodyPr/>
+                    <a:lstStyle/>
+                    <a:p>
+                      <a:r>
+                        <a:rPr lang="en-GB" sz="1600" dirty="0">
+                          <a:latin typeface="+mn-lt"/>
+                          <a:ea typeface="Menlo" panose="020B0609030804020204" pitchFamily="49" charset="0"/>
+                          <a:cs typeface="Menlo" panose="020B0609030804020204" pitchFamily="49" charset="0"/>
+                        </a:rPr>
+                        <a:t>Deduced Property</a:t>
+                      </a:r>
+                    </a:p>
+                  </a:txBody>
+                  <a:tcPr/>
+                </a:tc>
+                <a:extLst>
+                  <a:ext uri="{0D108BD9-81ED-4DB2-BD59-A6C34878D82A}">
+                    <a16:rowId xmlns:a16="http://schemas.microsoft.com/office/drawing/2014/main" val="3104018882"/>
+                  </a:ext>
+                </a:extLst>
+              </a:tr>
+              <a:tr h="370840">
+                <a:tc>
+                  <a:txBody>
+                    <a:bodyPr/>
+                    <a:lstStyle/>
+                    <a:p>
+                      <a:pPr marL="0" marR="0" lvl="0" indent="0" algn="l" defTabSz="457200" rtl="0" eaLnBrk="1" fontAlgn="auto" latinLnBrk="0" hangingPunct="1">
+                        <a:lnSpc>
+                          <a:spcPct val="100000"/>
+                        </a:lnSpc>
+                        <a:spcBef>
+                          <a:spcPts val="0"/>
+                        </a:spcBef>
+                        <a:spcAft>
+                          <a:spcPts val="0"/>
+                        </a:spcAft>
+                        <a:buClrTx/>
+                        <a:buSzTx/>
+                        <a:buFontTx/>
+                        <a:buNone/>
+                        <a:tabLst/>
+                        <a:defRPr/>
+                      </a:pPr>
+                      <a:r>
+                        <a:rPr lang="en-GB" sz="1600" kern="1200" dirty="0" err="1">
+                          <a:solidFill>
+                            <a:schemeClr val="dk1"/>
+                          </a:solidFill>
+                          <a:effectLst/>
+                          <a:latin typeface="Menlo" panose="020B0609030804020204" pitchFamily="49" charset="0"/>
+                          <a:ea typeface="Menlo" panose="020B0609030804020204" pitchFamily="49" charset="0"/>
+                          <a:cs typeface="Menlo" panose="020B0609030804020204" pitchFamily="49" charset="0"/>
+                        </a:rPr>
+                        <a:t>val</a:t>
+                      </a:r>
+                      <a:r>
+                        <a:rPr lang="en-GB" sz="1600" kern="1200" dirty="0">
+                          <a:solidFill>
+                            <a:schemeClr val="dk1"/>
+                          </a:solidFill>
+                          <a:effectLst/>
+                          <a:latin typeface="Menlo" panose="020B0609030804020204" pitchFamily="49" charset="0"/>
+                          <a:ea typeface="Menlo" panose="020B0609030804020204" pitchFamily="49" charset="0"/>
+                          <a:cs typeface="Menlo" panose="020B0609030804020204" pitchFamily="49" charset="0"/>
+                        </a:rPr>
+                        <a:t> empty: ISZ[Z] = ISZ()</a:t>
+                      </a:r>
+                    </a:p>
+                  </a:txBody>
+                  <a:tcPr/>
+                </a:tc>
+                <a:tc>
+                  <a:txBody>
+                    <a:bodyPr/>
+                    <a:lstStyle/>
+                    <a:p>
+                      <a:r>
+                        <a:rPr lang="en-GB" sz="1600" dirty="0">
+                          <a:latin typeface="+mn-lt"/>
+                          <a:ea typeface="Menlo" panose="020B0609030804020204" pitchFamily="49" charset="0"/>
+                          <a:cs typeface="Menlo" panose="020B0609030804020204" pitchFamily="49" charset="0"/>
+                        </a:rPr>
+                        <a:t>Empty sequence</a:t>
+                      </a:r>
+                    </a:p>
+                  </a:txBody>
+                  <a:tcPr/>
+                </a:tc>
+                <a:tc>
+                  <a:txBody>
+                    <a:bodyPr/>
+                    <a:lstStyle/>
+                    <a:p>
+                      <a:pPr marL="0" marR="0" lvl="0" indent="0" algn="l" defTabSz="457200" rtl="0" eaLnBrk="1" fontAlgn="auto" latinLnBrk="0" hangingPunct="1">
+                        <a:lnSpc>
+                          <a:spcPct val="100000"/>
+                        </a:lnSpc>
+                        <a:spcBef>
+                          <a:spcPts val="0"/>
+                        </a:spcBef>
+                        <a:spcAft>
+                          <a:spcPts val="0"/>
+                        </a:spcAft>
+                        <a:buClrTx/>
+                        <a:buSzTx/>
+                        <a:buFontTx/>
+                        <a:buNone/>
+                        <a:tabLst/>
+                        <a:defRPr/>
+                      </a:pPr>
+                      <a:r>
+                        <a:rPr lang="en-GB" sz="1600" kern="1200" dirty="0" err="1">
+                          <a:solidFill>
+                            <a:schemeClr val="dk1"/>
+                          </a:solidFill>
+                          <a:effectLst/>
+                          <a:latin typeface="Menlo" panose="020B0609030804020204" pitchFamily="49" charset="0"/>
+                          <a:ea typeface="Menlo" panose="020B0609030804020204" pitchFamily="49" charset="0"/>
+                          <a:cs typeface="Menlo" panose="020B0609030804020204" pitchFamily="49" charset="0"/>
+                        </a:rPr>
+                        <a:t>empty.isEmpty</a:t>
+                      </a:r>
+                      <a:endParaRPr lang="en-GB" sz="1600" kern="1200" dirty="0">
+                        <a:solidFill>
+                          <a:schemeClr val="dk1"/>
+                        </a:solidFill>
+                        <a:effectLst/>
+                        <a:latin typeface="Menlo" panose="020B0609030804020204" pitchFamily="49" charset="0"/>
+                        <a:ea typeface="Menlo" panose="020B0609030804020204" pitchFamily="49" charset="0"/>
+                        <a:cs typeface="Menlo" panose="020B0609030804020204" pitchFamily="49" charset="0"/>
+                      </a:endParaRPr>
+                    </a:p>
+                  </a:txBody>
+                  <a:tcPr/>
+                </a:tc>
+                <a:extLst>
+                  <a:ext uri="{0D108BD9-81ED-4DB2-BD59-A6C34878D82A}">
+                    <a16:rowId xmlns:a16="http://schemas.microsoft.com/office/drawing/2014/main" val="2310063540"/>
+                  </a:ext>
+                </a:extLst>
+              </a:tr>
+              <a:tr h="370840">
+                <a:tc>
+                  <a:txBody>
+                    <a:bodyPr/>
+                    <a:lstStyle/>
+                    <a:p>
+                      <a:pPr marL="0" marR="0" lvl="0" indent="0" algn="l" defTabSz="457200" rtl="0" eaLnBrk="1" fontAlgn="auto" latinLnBrk="0" hangingPunct="1">
+                        <a:lnSpc>
+                          <a:spcPct val="100000"/>
+                        </a:lnSpc>
+                        <a:spcBef>
+                          <a:spcPts val="0"/>
+                        </a:spcBef>
+                        <a:spcAft>
+                          <a:spcPts val="0"/>
+                        </a:spcAft>
+                        <a:buClrTx/>
+                        <a:buSzTx/>
+                        <a:buFontTx/>
+                        <a:buNone/>
+                        <a:tabLst/>
+                        <a:defRPr/>
+                      </a:pPr>
+                      <a:r>
+                        <a:rPr lang="en-GB" sz="1600" kern="1200" dirty="0" err="1">
+                          <a:solidFill>
+                            <a:schemeClr val="dk1"/>
+                          </a:solidFill>
+                          <a:effectLst/>
+                          <a:latin typeface="Menlo" panose="020B0609030804020204" pitchFamily="49" charset="0"/>
+                          <a:ea typeface="Menlo" panose="020B0609030804020204" pitchFamily="49" charset="0"/>
+                          <a:cs typeface="Menlo" panose="020B0609030804020204" pitchFamily="49" charset="0"/>
+                        </a:rPr>
+                        <a:t>val</a:t>
+                      </a:r>
+                      <a:r>
+                        <a:rPr lang="en-GB" sz="1600" kern="1200" dirty="0">
+                          <a:solidFill>
+                            <a:schemeClr val="dk1"/>
+                          </a:solidFill>
+                          <a:effectLst/>
+                          <a:latin typeface="Menlo" panose="020B0609030804020204" pitchFamily="49" charset="0"/>
+                          <a:ea typeface="Menlo" panose="020B0609030804020204" pitchFamily="49" charset="0"/>
+                          <a:cs typeface="Menlo" panose="020B0609030804020204" pitchFamily="49" charset="0"/>
+                        </a:rPr>
+                        <a:t> s1: ISZ[Z] = ISZ(1)</a:t>
+                      </a:r>
+                    </a:p>
+                  </a:txBody>
+                  <a:tcPr/>
+                </a:tc>
+                <a:tc>
+                  <a:txBody>
+                    <a:bodyPr/>
+                    <a:lstStyle/>
+                    <a:p>
+                      <a:r>
+                        <a:rPr lang="en-GB" sz="1600" dirty="0">
+                          <a:latin typeface="+mn-lt"/>
+                          <a:ea typeface="Menlo" panose="020B0609030804020204" pitchFamily="49" charset="0"/>
+                          <a:cs typeface="Menlo" panose="020B0609030804020204" pitchFamily="49" charset="0"/>
+                        </a:rPr>
+                        <a:t>Sequence const.</a:t>
+                      </a:r>
+                    </a:p>
+                  </a:txBody>
+                  <a:tcPr/>
+                </a:tc>
+                <a:tc>
+                  <a:txBody>
+                    <a:bodyPr/>
+                    <a:lstStyle/>
+                    <a:p>
+                      <a:r>
+                        <a:rPr lang="en-GB" sz="1600" dirty="0">
+                          <a:latin typeface="Menlo" panose="020B0609030804020204" pitchFamily="49" charset="0"/>
+                          <a:ea typeface="Menlo" panose="020B0609030804020204" pitchFamily="49" charset="0"/>
+                          <a:cs typeface="Menlo" panose="020B0609030804020204" pitchFamily="49" charset="0"/>
+                        </a:rPr>
+                        <a:t>s1(0) == 1</a:t>
+                      </a:r>
+                    </a:p>
+                  </a:txBody>
+                  <a:tcPr/>
+                </a:tc>
+                <a:extLst>
+                  <a:ext uri="{0D108BD9-81ED-4DB2-BD59-A6C34878D82A}">
+                    <a16:rowId xmlns:a16="http://schemas.microsoft.com/office/drawing/2014/main" val="851259390"/>
+                  </a:ext>
+                </a:extLst>
+              </a:tr>
+              <a:tr h="370840">
+                <a:tc>
+                  <a:txBody>
+                    <a:bodyPr/>
+                    <a:lstStyle/>
+                    <a:p>
+                      <a:pPr marL="0" marR="0" lvl="0" indent="0" algn="l" defTabSz="457200" rtl="0" eaLnBrk="1" fontAlgn="auto" latinLnBrk="0" hangingPunct="1">
+                        <a:lnSpc>
+                          <a:spcPct val="100000"/>
+                        </a:lnSpc>
+                        <a:spcBef>
+                          <a:spcPts val="0"/>
+                        </a:spcBef>
+                        <a:spcAft>
+                          <a:spcPts val="0"/>
+                        </a:spcAft>
+                        <a:buClrTx/>
+                        <a:buSzTx/>
+                        <a:buFontTx/>
+                        <a:buNone/>
+                        <a:tabLst/>
+                        <a:defRPr/>
+                      </a:pPr>
+                      <a:r>
+                        <a:rPr lang="en-GB" sz="1600" kern="1200" dirty="0" err="1">
+                          <a:solidFill>
+                            <a:schemeClr val="dk1"/>
+                          </a:solidFill>
+                          <a:effectLst/>
+                          <a:latin typeface="Menlo" panose="020B0609030804020204" pitchFamily="49" charset="0"/>
+                          <a:ea typeface="Menlo" panose="020B0609030804020204" pitchFamily="49" charset="0"/>
+                          <a:cs typeface="Menlo" panose="020B0609030804020204" pitchFamily="49" charset="0"/>
+                        </a:rPr>
+                        <a:t>val</a:t>
+                      </a:r>
+                      <a:r>
+                        <a:rPr lang="en-GB" sz="1600" kern="1200" dirty="0">
+                          <a:solidFill>
+                            <a:schemeClr val="dk1"/>
+                          </a:solidFill>
+                          <a:effectLst/>
+                          <a:latin typeface="Menlo" panose="020B0609030804020204" pitchFamily="49" charset="0"/>
+                          <a:ea typeface="Menlo" panose="020B0609030804020204" pitchFamily="49" charset="0"/>
+                          <a:cs typeface="Menlo" panose="020B0609030804020204" pitchFamily="49" charset="0"/>
+                        </a:rPr>
+                        <a:t> s2: ISZ[Z] = ISZ(2)</a:t>
+                      </a:r>
+                    </a:p>
+                  </a:txBody>
+                  <a:tcPr/>
+                </a:tc>
+                <a:tc>
+                  <a:txBody>
+                    <a:bodyPr/>
+                    <a:lstStyle/>
+                    <a:p>
+                      <a:r>
+                        <a:rPr lang="en-GB" sz="1600" dirty="0">
+                          <a:latin typeface="+mn-lt"/>
+                          <a:ea typeface="Menlo" panose="020B0609030804020204" pitchFamily="49" charset="0"/>
+                          <a:cs typeface="Menlo" panose="020B0609030804020204" pitchFamily="49" charset="0"/>
+                        </a:rPr>
+                        <a:t>Sequence const.</a:t>
+                      </a:r>
+                    </a:p>
+                  </a:txBody>
+                  <a:tcPr/>
+                </a:tc>
+                <a:tc>
+                  <a:txBody>
+                    <a:bodyPr/>
+                    <a:lstStyle/>
+                    <a:p>
+                      <a:r>
+                        <a:rPr lang="en-GB" sz="1600" dirty="0">
+                          <a:latin typeface="Menlo" panose="020B0609030804020204" pitchFamily="49" charset="0"/>
+                          <a:ea typeface="Menlo" panose="020B0609030804020204" pitchFamily="49" charset="0"/>
+                          <a:cs typeface="Menlo" panose="020B0609030804020204" pitchFamily="49" charset="0"/>
+                        </a:rPr>
+                        <a:t>¬s2.isEmpty</a:t>
+                      </a:r>
+                    </a:p>
+                  </a:txBody>
+                  <a:tcPr/>
+                </a:tc>
+                <a:extLst>
+                  <a:ext uri="{0D108BD9-81ED-4DB2-BD59-A6C34878D82A}">
+                    <a16:rowId xmlns:a16="http://schemas.microsoft.com/office/drawing/2014/main" val="249025699"/>
+                  </a:ext>
+                </a:extLst>
+              </a:tr>
+              <a:tr h="370840">
+                <a:tc>
+                  <a:txBody>
+                    <a:bodyPr/>
+                    <a:lstStyle/>
+                    <a:p>
+                      <a:pPr marL="0" marR="0" lvl="0" indent="0" algn="l" defTabSz="457200" rtl="0" eaLnBrk="1" fontAlgn="auto" latinLnBrk="0" hangingPunct="1">
+                        <a:lnSpc>
+                          <a:spcPct val="100000"/>
+                        </a:lnSpc>
+                        <a:spcBef>
+                          <a:spcPts val="0"/>
+                        </a:spcBef>
+                        <a:spcAft>
+                          <a:spcPts val="0"/>
+                        </a:spcAft>
+                        <a:buClrTx/>
+                        <a:buSzTx/>
+                        <a:buFontTx/>
+                        <a:buNone/>
+                        <a:tabLst/>
+                        <a:defRPr/>
+                      </a:pPr>
+                      <a:r>
+                        <a:rPr lang="en-GB" sz="1600" kern="1200" dirty="0" err="1">
+                          <a:solidFill>
+                            <a:schemeClr val="dk1"/>
+                          </a:solidFill>
+                          <a:effectLst/>
+                          <a:latin typeface="Menlo" panose="020B0609030804020204" pitchFamily="49" charset="0"/>
+                          <a:ea typeface="Menlo" panose="020B0609030804020204" pitchFamily="49" charset="0"/>
+                          <a:cs typeface="Menlo" panose="020B0609030804020204" pitchFamily="49" charset="0"/>
+                        </a:rPr>
+                        <a:t>val</a:t>
+                      </a:r>
+                      <a:r>
+                        <a:rPr lang="en-GB" sz="1600" kern="1200" dirty="0">
+                          <a:solidFill>
+                            <a:schemeClr val="dk1"/>
+                          </a:solidFill>
+                          <a:effectLst/>
+                          <a:latin typeface="Menlo" panose="020B0609030804020204" pitchFamily="49" charset="0"/>
+                          <a:ea typeface="Menlo" panose="020B0609030804020204" pitchFamily="49" charset="0"/>
+                          <a:cs typeface="Menlo" panose="020B0609030804020204" pitchFamily="49" charset="0"/>
+                        </a:rPr>
+                        <a:t> s3: ISZ[Z] = ISZ(1, 2)</a:t>
+                      </a:r>
+                    </a:p>
+                  </a:txBody>
+                  <a:tcPr/>
+                </a:tc>
+                <a:tc>
+                  <a:txBody>
+                    <a:bodyPr/>
+                    <a:lstStyle/>
+                    <a:p>
+                      <a:r>
+                        <a:rPr lang="en-GB" sz="1600" dirty="0">
+                          <a:latin typeface="+mn-lt"/>
+                          <a:ea typeface="Menlo" panose="020B0609030804020204" pitchFamily="49" charset="0"/>
+                          <a:cs typeface="Menlo" panose="020B0609030804020204" pitchFamily="49" charset="0"/>
+                        </a:rPr>
+                        <a:t>Sequence const.</a:t>
+                      </a:r>
+                    </a:p>
+                  </a:txBody>
+                  <a:tcPr/>
+                </a:tc>
+                <a:tc>
+                  <a:txBody>
+                    <a:bodyPr/>
+                    <a:lstStyle/>
+                    <a:p>
+                      <a:pPr marL="0" marR="0" lvl="0" indent="0" algn="l" defTabSz="457200" rtl="0" eaLnBrk="1" fontAlgn="auto" latinLnBrk="0" hangingPunct="1">
+                        <a:lnSpc>
+                          <a:spcPct val="100000"/>
+                        </a:lnSpc>
+                        <a:spcBef>
+                          <a:spcPts val="0"/>
+                        </a:spcBef>
+                        <a:spcAft>
+                          <a:spcPts val="0"/>
+                        </a:spcAft>
+                        <a:buClrTx/>
+                        <a:buSzTx/>
+                        <a:buFontTx/>
+                        <a:buNone/>
+                        <a:tabLst/>
+                        <a:defRPr/>
+                      </a:pPr>
+                      <a:r>
+                        <a:rPr lang="en-GB" sz="1600" kern="1200" dirty="0">
+                          <a:solidFill>
+                            <a:schemeClr val="dk1"/>
+                          </a:solidFill>
+                          <a:effectLst/>
+                          <a:latin typeface="Menlo" panose="020B0609030804020204" pitchFamily="49" charset="0"/>
+                          <a:ea typeface="Menlo" panose="020B0609030804020204" pitchFamily="49" charset="0"/>
+                          <a:cs typeface="Menlo" panose="020B0609030804020204" pitchFamily="49" charset="0"/>
+                        </a:rPr>
+                        <a:t>s3.size == 2</a:t>
+                      </a:r>
+                    </a:p>
+                  </a:txBody>
+                  <a:tcPr/>
+                </a:tc>
+                <a:extLst>
+                  <a:ext uri="{0D108BD9-81ED-4DB2-BD59-A6C34878D82A}">
+                    <a16:rowId xmlns:a16="http://schemas.microsoft.com/office/drawing/2014/main" val="3242920819"/>
+                  </a:ext>
+                </a:extLst>
+              </a:tr>
+              <a:tr h="370840">
+                <a:tc>
+                  <a:txBody>
+                    <a:bodyPr/>
+                    <a:lstStyle/>
+                    <a:p>
+                      <a:pPr marL="0" marR="0" lvl="0" indent="0" algn="l" defTabSz="457200" rtl="0" eaLnBrk="1" fontAlgn="auto" latinLnBrk="0" hangingPunct="1">
+                        <a:lnSpc>
+                          <a:spcPct val="100000"/>
+                        </a:lnSpc>
+                        <a:spcBef>
+                          <a:spcPts val="0"/>
+                        </a:spcBef>
+                        <a:spcAft>
+                          <a:spcPts val="0"/>
+                        </a:spcAft>
+                        <a:buClrTx/>
+                        <a:buSzTx/>
+                        <a:buFontTx/>
+                        <a:buNone/>
+                        <a:tabLst/>
+                        <a:defRPr/>
+                      </a:pPr>
+                      <a:r>
+                        <a:rPr lang="en-GB" sz="1600" kern="1200" dirty="0" err="1">
+                          <a:solidFill>
+                            <a:schemeClr val="dk1"/>
+                          </a:solidFill>
+                          <a:effectLst/>
+                          <a:latin typeface="Menlo" panose="020B0609030804020204" pitchFamily="49" charset="0"/>
+                          <a:ea typeface="Menlo" panose="020B0609030804020204" pitchFamily="49" charset="0"/>
+                          <a:cs typeface="Menlo" panose="020B0609030804020204" pitchFamily="49" charset="0"/>
+                        </a:rPr>
+                        <a:t>val</a:t>
+                      </a:r>
+                      <a:r>
+                        <a:rPr lang="en-GB" sz="1600" kern="1200" dirty="0">
+                          <a:solidFill>
+                            <a:schemeClr val="dk1"/>
+                          </a:solidFill>
+                          <a:effectLst/>
+                          <a:latin typeface="Menlo" panose="020B0609030804020204" pitchFamily="49" charset="0"/>
+                          <a:ea typeface="Menlo" panose="020B0609030804020204" pitchFamily="49" charset="0"/>
+                          <a:cs typeface="Menlo" panose="020B0609030804020204" pitchFamily="49" charset="0"/>
+                        </a:rPr>
+                        <a:t> s4: ISZ[Z] = ISZ(2, 1)</a:t>
+                      </a:r>
+                    </a:p>
+                  </a:txBody>
+                  <a:tcPr/>
+                </a:tc>
+                <a:tc>
+                  <a:txBody>
+                    <a:bodyPr/>
+                    <a:lstStyle/>
+                    <a:p>
+                      <a:r>
+                        <a:rPr lang="en-GB" sz="1600" dirty="0">
+                          <a:latin typeface="+mn-lt"/>
+                          <a:ea typeface="Menlo" panose="020B0609030804020204" pitchFamily="49" charset="0"/>
+                          <a:cs typeface="Menlo" panose="020B0609030804020204" pitchFamily="49" charset="0"/>
+                        </a:rPr>
+                        <a:t>Sequence const.</a:t>
+                      </a:r>
+                    </a:p>
+                  </a:txBody>
+                  <a:tcPr/>
+                </a:tc>
+                <a:tc>
+                  <a:txBody>
+                    <a:bodyPr/>
+                    <a:lstStyle/>
+                    <a:p>
+                      <a:pPr marL="0" marR="0" lvl="0" indent="0" algn="l" defTabSz="457200" rtl="0" eaLnBrk="1" fontAlgn="auto" latinLnBrk="0" hangingPunct="1">
+                        <a:lnSpc>
+                          <a:spcPct val="100000"/>
+                        </a:lnSpc>
+                        <a:spcBef>
+                          <a:spcPts val="0"/>
+                        </a:spcBef>
+                        <a:spcAft>
+                          <a:spcPts val="0"/>
+                        </a:spcAft>
+                        <a:buClrTx/>
+                        <a:buSzTx/>
+                        <a:buFontTx/>
+                        <a:buNone/>
+                        <a:tabLst/>
+                        <a:defRPr/>
+                      </a:pPr>
+                      <a:r>
+                        <a:rPr lang="en-GB" sz="1600" kern="1200" dirty="0">
+                          <a:solidFill>
+                            <a:schemeClr val="dk1"/>
+                          </a:solidFill>
+                          <a:effectLst/>
+                          <a:latin typeface="Menlo" panose="020B0609030804020204" pitchFamily="49" charset="0"/>
+                          <a:ea typeface="Menlo" panose="020B0609030804020204" pitchFamily="49" charset="0"/>
+                          <a:cs typeface="Menlo" panose="020B0609030804020204" pitchFamily="49" charset="0"/>
+                        </a:rPr>
+                        <a:t>s3(0) == s4(1)</a:t>
+                      </a:r>
+                    </a:p>
+                  </a:txBody>
+                  <a:tcPr/>
+                </a:tc>
+                <a:extLst>
+                  <a:ext uri="{0D108BD9-81ED-4DB2-BD59-A6C34878D82A}">
+                    <a16:rowId xmlns:a16="http://schemas.microsoft.com/office/drawing/2014/main" val="4115822377"/>
+                  </a:ext>
+                </a:extLst>
+              </a:tr>
+              <a:tr h="370840">
+                <a:tc>
+                  <a:txBody>
+                    <a:bodyPr/>
+                    <a:lstStyle/>
+                    <a:p>
+                      <a:r>
+                        <a:rPr lang="en-GB" sz="1600" dirty="0" err="1">
+                          <a:latin typeface="Menlo" panose="020B0609030804020204" pitchFamily="49" charset="0"/>
+                          <a:ea typeface="Menlo" panose="020B0609030804020204" pitchFamily="49" charset="0"/>
+                          <a:cs typeface="Menlo" panose="020B0609030804020204" pitchFamily="49" charset="0"/>
+                        </a:rPr>
+                        <a:t>val</a:t>
+                      </a:r>
+                      <a:r>
+                        <a:rPr lang="en-GB" sz="1600" dirty="0">
+                          <a:latin typeface="Menlo" panose="020B0609030804020204" pitchFamily="49" charset="0"/>
+                          <a:ea typeface="Menlo" panose="020B0609030804020204" pitchFamily="49" charset="0"/>
+                          <a:cs typeface="Menlo" panose="020B0609030804020204" pitchFamily="49" charset="0"/>
+                        </a:rPr>
+                        <a:t> s5</a:t>
+                      </a:r>
+                      <a:r>
+                        <a:rPr lang="en-GB" sz="1600" kern="1200" dirty="0">
+                          <a:solidFill>
+                            <a:schemeClr val="dk1"/>
+                          </a:solidFill>
+                          <a:effectLst/>
+                          <a:latin typeface="Menlo" panose="020B0609030804020204" pitchFamily="49" charset="0"/>
+                          <a:ea typeface="Menlo" panose="020B0609030804020204" pitchFamily="49" charset="0"/>
+                          <a:cs typeface="Menlo" panose="020B0609030804020204" pitchFamily="49" charset="0"/>
+                        </a:rPr>
+                        <a:t>: ISZ[Z]</a:t>
+                      </a:r>
+                      <a:r>
+                        <a:rPr lang="en-GB" sz="1600" dirty="0">
+                          <a:latin typeface="Menlo" panose="020B0609030804020204" pitchFamily="49" charset="0"/>
+                          <a:ea typeface="Menlo" panose="020B0609030804020204" pitchFamily="49" charset="0"/>
+                          <a:cs typeface="Menlo" panose="020B0609030804020204" pitchFamily="49" charset="0"/>
+                        </a:rPr>
+                        <a:t> = s1 :+ 2</a:t>
+                      </a:r>
+                    </a:p>
+                  </a:txBody>
+                  <a:tcPr/>
+                </a:tc>
+                <a:tc>
+                  <a:txBody>
+                    <a:bodyPr/>
+                    <a:lstStyle/>
+                    <a:p>
+                      <a:r>
+                        <a:rPr lang="en-GB" sz="1600" dirty="0">
+                          <a:latin typeface="+mn-lt"/>
+                          <a:ea typeface="Menlo" panose="020B0609030804020204" pitchFamily="49" charset="0"/>
+                          <a:cs typeface="Menlo" panose="020B0609030804020204" pitchFamily="49" charset="0"/>
+                        </a:rPr>
+                        <a:t>Push (right)</a:t>
+                      </a:r>
+                    </a:p>
+                  </a:txBody>
+                  <a:tcPr/>
+                </a:tc>
+                <a:tc>
+                  <a:txBody>
+                    <a:bodyPr/>
+                    <a:lstStyle/>
+                    <a:p>
+                      <a:r>
+                        <a:rPr lang="en-GB" sz="1600" dirty="0">
+                          <a:latin typeface="Menlo" panose="020B0609030804020204" pitchFamily="49" charset="0"/>
+                          <a:ea typeface="Menlo" panose="020B0609030804020204" pitchFamily="49" charset="0"/>
+                          <a:cs typeface="Menlo" panose="020B0609030804020204" pitchFamily="49" charset="0"/>
+                        </a:rPr>
+                        <a:t>s3 == s5</a:t>
+                      </a:r>
+                    </a:p>
+                  </a:txBody>
+                  <a:tcPr/>
+                </a:tc>
+                <a:extLst>
+                  <a:ext uri="{0D108BD9-81ED-4DB2-BD59-A6C34878D82A}">
+                    <a16:rowId xmlns:a16="http://schemas.microsoft.com/office/drawing/2014/main" val="3538660751"/>
+                  </a:ext>
+                </a:extLst>
+              </a:tr>
+              <a:tr h="370840">
+                <a:tc>
+                  <a:txBody>
+                    <a:bodyPr/>
+                    <a:lstStyle/>
+                    <a:p>
+                      <a:r>
+                        <a:rPr lang="en-GB" sz="1600" dirty="0" err="1">
+                          <a:latin typeface="Menlo" panose="020B0609030804020204" pitchFamily="49" charset="0"/>
+                          <a:ea typeface="Menlo" panose="020B0609030804020204" pitchFamily="49" charset="0"/>
+                          <a:cs typeface="Menlo" panose="020B0609030804020204" pitchFamily="49" charset="0"/>
+                        </a:rPr>
+                        <a:t>val</a:t>
+                      </a:r>
+                      <a:r>
+                        <a:rPr lang="en-GB" sz="1600" dirty="0">
+                          <a:latin typeface="Menlo" panose="020B0609030804020204" pitchFamily="49" charset="0"/>
+                          <a:ea typeface="Menlo" panose="020B0609030804020204" pitchFamily="49" charset="0"/>
+                          <a:cs typeface="Menlo" panose="020B0609030804020204" pitchFamily="49" charset="0"/>
+                        </a:rPr>
+                        <a:t> s6</a:t>
+                      </a:r>
+                      <a:r>
+                        <a:rPr lang="en-GB" sz="1600" kern="1200" dirty="0">
+                          <a:solidFill>
+                            <a:schemeClr val="dk1"/>
+                          </a:solidFill>
+                          <a:effectLst/>
+                          <a:latin typeface="Menlo" panose="020B0609030804020204" pitchFamily="49" charset="0"/>
+                          <a:ea typeface="Menlo" panose="020B0609030804020204" pitchFamily="49" charset="0"/>
+                          <a:cs typeface="Menlo" panose="020B0609030804020204" pitchFamily="49" charset="0"/>
+                        </a:rPr>
+                        <a:t>: ISZ[Z]</a:t>
+                      </a:r>
+                      <a:r>
+                        <a:rPr lang="en-GB" sz="1600" dirty="0">
+                          <a:latin typeface="Menlo" panose="020B0609030804020204" pitchFamily="49" charset="0"/>
+                          <a:ea typeface="Menlo" panose="020B0609030804020204" pitchFamily="49" charset="0"/>
+                          <a:cs typeface="Menlo" panose="020B0609030804020204" pitchFamily="49" charset="0"/>
+                        </a:rPr>
+                        <a:t> = 1 +: s2</a:t>
+                      </a:r>
+                    </a:p>
+                  </a:txBody>
+                  <a:tcPr/>
+                </a:tc>
+                <a:tc>
+                  <a:txBody>
+                    <a:bodyPr/>
+                    <a:lstStyle/>
+                    <a:p>
+                      <a:r>
+                        <a:rPr lang="en-GB" sz="1600" dirty="0">
+                          <a:latin typeface="+mn-lt"/>
+                          <a:ea typeface="Menlo" panose="020B0609030804020204" pitchFamily="49" charset="0"/>
+                          <a:cs typeface="Menlo" panose="020B0609030804020204" pitchFamily="49" charset="0"/>
+                        </a:rPr>
+                        <a:t>Push (left)</a:t>
+                      </a:r>
+                    </a:p>
+                  </a:txBody>
+                  <a:tcPr/>
+                </a:tc>
+                <a:tc>
+                  <a:txBody>
+                    <a:bodyPr/>
+                    <a:lstStyle/>
+                    <a:p>
+                      <a:r>
+                        <a:rPr lang="en-GB" sz="1600" dirty="0">
+                          <a:latin typeface="Menlo" panose="020B0609030804020204" pitchFamily="49" charset="0"/>
+                          <a:ea typeface="Menlo" panose="020B0609030804020204" pitchFamily="49" charset="0"/>
+                          <a:cs typeface="Menlo" panose="020B0609030804020204" pitchFamily="49" charset="0"/>
+                        </a:rPr>
+                        <a:t>s3 == s5</a:t>
+                      </a:r>
+                    </a:p>
+                  </a:txBody>
+                  <a:tcPr/>
+                </a:tc>
+                <a:extLst>
+                  <a:ext uri="{0D108BD9-81ED-4DB2-BD59-A6C34878D82A}">
+                    <a16:rowId xmlns:a16="http://schemas.microsoft.com/office/drawing/2014/main" val="2939459059"/>
+                  </a:ext>
+                </a:extLst>
+              </a:tr>
+              <a:tr h="370840">
+                <a:tc>
+                  <a:txBody>
+                    <a:bodyPr/>
+                    <a:lstStyle/>
+                    <a:p>
+                      <a:r>
+                        <a:rPr lang="en-GB" sz="1600" dirty="0" err="1">
+                          <a:latin typeface="Menlo" panose="020B0609030804020204" pitchFamily="49" charset="0"/>
+                          <a:ea typeface="Menlo" panose="020B0609030804020204" pitchFamily="49" charset="0"/>
+                          <a:cs typeface="Menlo" panose="020B0609030804020204" pitchFamily="49" charset="0"/>
+                        </a:rPr>
+                        <a:t>val</a:t>
+                      </a:r>
+                      <a:r>
+                        <a:rPr lang="en-GB" sz="1600" dirty="0">
+                          <a:latin typeface="Menlo" panose="020B0609030804020204" pitchFamily="49" charset="0"/>
+                          <a:ea typeface="Menlo" panose="020B0609030804020204" pitchFamily="49" charset="0"/>
+                          <a:cs typeface="Menlo" panose="020B0609030804020204" pitchFamily="49" charset="0"/>
+                        </a:rPr>
+                        <a:t> s7</a:t>
+                      </a:r>
+                      <a:r>
+                        <a:rPr lang="en-GB" sz="1600" kern="1200" dirty="0">
+                          <a:solidFill>
+                            <a:schemeClr val="dk1"/>
+                          </a:solidFill>
+                          <a:effectLst/>
+                          <a:latin typeface="Menlo" panose="020B0609030804020204" pitchFamily="49" charset="0"/>
+                          <a:ea typeface="Menlo" panose="020B0609030804020204" pitchFamily="49" charset="0"/>
+                          <a:cs typeface="Menlo" panose="020B0609030804020204" pitchFamily="49" charset="0"/>
+                        </a:rPr>
+                        <a:t>: ISZ[Z] = s1 ++ s2</a:t>
+                      </a:r>
+                      <a:endParaRPr lang="en-GB" sz="1600" dirty="0">
+                        <a:latin typeface="Menlo" panose="020B0609030804020204" pitchFamily="49" charset="0"/>
+                        <a:ea typeface="Menlo" panose="020B0609030804020204" pitchFamily="49" charset="0"/>
+                        <a:cs typeface="Menlo" panose="020B0609030804020204" pitchFamily="49" charset="0"/>
+                      </a:endParaRPr>
+                    </a:p>
+                  </a:txBody>
+                  <a:tcPr/>
+                </a:tc>
+                <a:tc>
+                  <a:txBody>
+                    <a:bodyPr/>
+                    <a:lstStyle/>
+                    <a:p>
+                      <a:r>
+                        <a:rPr lang="en-GB" sz="1600" dirty="0">
+                          <a:latin typeface="+mn-lt"/>
+                          <a:ea typeface="Menlo" panose="020B0609030804020204" pitchFamily="49" charset="0"/>
+                          <a:cs typeface="Menlo" panose="020B0609030804020204" pitchFamily="49" charset="0"/>
+                        </a:rPr>
+                        <a:t>Concatenate</a:t>
+                      </a:r>
+                    </a:p>
+                  </a:txBody>
+                  <a:tcPr/>
+                </a:tc>
+                <a:tc>
+                  <a:txBody>
+                    <a:bodyPr/>
+                    <a:lstStyle/>
+                    <a:p>
+                      <a:r>
+                        <a:rPr lang="en-GB" sz="1600" dirty="0">
+                          <a:latin typeface="Menlo" panose="020B0609030804020204" pitchFamily="49" charset="0"/>
+                          <a:ea typeface="Menlo" panose="020B0609030804020204" pitchFamily="49" charset="0"/>
+                          <a:cs typeface="Menlo" panose="020B0609030804020204" pitchFamily="49" charset="0"/>
+                        </a:rPr>
+                        <a:t>s3 == s7</a:t>
+                      </a:r>
+                    </a:p>
+                  </a:txBody>
+                  <a:tcPr/>
+                </a:tc>
+                <a:extLst>
+                  <a:ext uri="{0D108BD9-81ED-4DB2-BD59-A6C34878D82A}">
+                    <a16:rowId xmlns:a16="http://schemas.microsoft.com/office/drawing/2014/main" val="997683345"/>
+                  </a:ext>
+                </a:extLst>
+              </a:tr>
+              <a:tr h="370840">
+                <a:tc>
+                  <a:txBody>
+                    <a:bodyPr/>
+                    <a:lstStyle/>
+                    <a:p>
+                      <a:r>
+                        <a:rPr lang="en-GB" sz="1600" dirty="0" err="1">
+                          <a:latin typeface="Menlo" panose="020B0609030804020204" pitchFamily="49" charset="0"/>
+                          <a:ea typeface="Menlo" panose="020B0609030804020204" pitchFamily="49" charset="0"/>
+                          <a:cs typeface="Menlo" panose="020B0609030804020204" pitchFamily="49" charset="0"/>
+                        </a:rPr>
+                        <a:t>val</a:t>
+                      </a:r>
+                      <a:r>
+                        <a:rPr lang="en-GB" sz="1600" dirty="0">
+                          <a:latin typeface="Menlo" panose="020B0609030804020204" pitchFamily="49" charset="0"/>
+                          <a:ea typeface="Menlo" panose="020B0609030804020204" pitchFamily="49" charset="0"/>
+                          <a:cs typeface="Menlo" panose="020B0609030804020204" pitchFamily="49" charset="0"/>
+                        </a:rPr>
+                        <a:t> s8: ISZ[Z] =</a:t>
+                      </a:r>
+                    </a:p>
+                    <a:p>
+                      <a:r>
+                        <a:rPr lang="en-GB" sz="1600" dirty="0">
+                          <a:latin typeface="Menlo" panose="020B0609030804020204" pitchFamily="49" charset="0"/>
+                          <a:ea typeface="Menlo" panose="020B0609030804020204" pitchFamily="49" charset="0"/>
+                          <a:cs typeface="Menlo" panose="020B0609030804020204" pitchFamily="49" charset="0"/>
+                        </a:rPr>
+                        <a:t>  s3(0 ⤳ s3(1), 1 ⤳ s3(0))</a:t>
+                      </a:r>
+                    </a:p>
+                  </a:txBody>
+                  <a:tcPr/>
+                </a:tc>
+                <a:tc>
+                  <a:txBody>
+                    <a:bodyPr/>
+                    <a:lstStyle/>
+                    <a:p>
+                      <a:r>
+                        <a:rPr lang="en-GB" sz="1600" dirty="0">
+                          <a:latin typeface="+mn-lt"/>
+                          <a:ea typeface="Menlo" panose="020B0609030804020204" pitchFamily="49" charset="0"/>
+                          <a:cs typeface="Menlo" panose="020B0609030804020204" pitchFamily="49" charset="0"/>
+                        </a:rPr>
+                        <a:t>Overwrite</a:t>
+                      </a:r>
+                      <a:br>
+                        <a:rPr lang="en-GB" sz="1600" dirty="0">
+                          <a:latin typeface="+mn-lt"/>
+                          <a:ea typeface="Menlo" panose="020B0609030804020204" pitchFamily="49" charset="0"/>
+                          <a:cs typeface="Menlo" panose="020B0609030804020204" pitchFamily="49" charset="0"/>
+                        </a:rPr>
+                      </a:br>
+                      <a:r>
+                        <a:rPr lang="en-GB" sz="1600" dirty="0">
+                          <a:latin typeface="+mn-lt"/>
+                          <a:ea typeface="Menlo" panose="020B0609030804020204" pitchFamily="49" charset="0"/>
+                          <a:cs typeface="Menlo" panose="020B0609030804020204" pitchFamily="49" charset="0"/>
+                        </a:rPr>
+                        <a:t>(here swap)</a:t>
+                      </a:r>
+                    </a:p>
+                  </a:txBody>
+                  <a:tcPr/>
+                </a:tc>
+                <a:tc>
+                  <a:txBody>
+                    <a:bodyPr/>
+                    <a:lstStyle/>
+                    <a:p>
+                      <a:r>
+                        <a:rPr lang="en-GB" sz="1600" dirty="0">
+                          <a:latin typeface="Menlo" panose="020B0609030804020204" pitchFamily="49" charset="0"/>
+                          <a:ea typeface="Menlo" panose="020B0609030804020204" pitchFamily="49" charset="0"/>
+                          <a:cs typeface="Menlo" panose="020B0609030804020204" pitchFamily="49" charset="0"/>
+                        </a:rPr>
+                        <a:t>s4 == s8</a:t>
+                      </a:r>
+                    </a:p>
+                  </a:txBody>
+                  <a:tcPr/>
+                </a:tc>
+                <a:extLst>
+                  <a:ext uri="{0D108BD9-81ED-4DB2-BD59-A6C34878D82A}">
+                    <a16:rowId xmlns:a16="http://schemas.microsoft.com/office/drawing/2014/main" val="922581914"/>
+                  </a:ext>
+                </a:extLst>
+              </a:tr>
+              <a:tr h="370840">
+                <a:tc>
+                  <a:txBody>
+                    <a:bodyPr/>
+                    <a:lstStyle/>
+                    <a:p>
+                      <a:r>
+                        <a:rPr lang="en-GB" sz="1600" dirty="0" err="1">
+                          <a:latin typeface="Menlo" panose="020B0609030804020204" pitchFamily="49" charset="0"/>
+                          <a:ea typeface="Menlo" panose="020B0609030804020204" pitchFamily="49" charset="0"/>
+                          <a:cs typeface="Menlo" panose="020B0609030804020204" pitchFamily="49" charset="0"/>
+                        </a:rPr>
+                        <a:t>val</a:t>
+                      </a:r>
+                      <a:r>
+                        <a:rPr lang="en-GB" sz="1600" dirty="0">
+                          <a:latin typeface="Menlo" panose="020B0609030804020204" pitchFamily="49" charset="0"/>
+                          <a:ea typeface="Menlo" panose="020B0609030804020204" pitchFamily="49" charset="0"/>
+                          <a:cs typeface="Menlo" panose="020B0609030804020204" pitchFamily="49" charset="0"/>
+                        </a:rPr>
+                        <a:t> v9: </a:t>
+                      </a:r>
+                      <a:r>
+                        <a:rPr lang="en-GB" sz="1600" dirty="0" err="1">
+                          <a:latin typeface="Menlo" panose="020B0609030804020204" pitchFamily="49" charset="0"/>
+                          <a:ea typeface="Menlo" panose="020B0609030804020204" pitchFamily="49" charset="0"/>
+                          <a:cs typeface="Menlo" panose="020B0609030804020204" pitchFamily="49" charset="0"/>
+                        </a:rPr>
+                        <a:t>ZRange</a:t>
+                      </a:r>
+                      <a:r>
+                        <a:rPr lang="en-GB" sz="1600" dirty="0">
+                          <a:latin typeface="Menlo" panose="020B0609030804020204" pitchFamily="49" charset="0"/>
+                          <a:ea typeface="Menlo" panose="020B0609030804020204" pitchFamily="49" charset="0"/>
+                          <a:cs typeface="Menlo" panose="020B0609030804020204" pitchFamily="49" charset="0"/>
+                        </a:rPr>
+                        <a:t>[Z] =</a:t>
+                      </a:r>
+                    </a:p>
+                    <a:p>
+                      <a:r>
+                        <a:rPr lang="en-GB" sz="1600" dirty="0">
+                          <a:latin typeface="Menlo" panose="020B0609030804020204" pitchFamily="49" charset="0"/>
+                          <a:ea typeface="Menlo" panose="020B0609030804020204" pitchFamily="49" charset="0"/>
+                          <a:cs typeface="Menlo" panose="020B0609030804020204" pitchFamily="49" charset="0"/>
+                        </a:rPr>
+                        <a:t>  s8.indices</a:t>
+                      </a:r>
+                    </a:p>
+                  </a:txBody>
+                  <a:tcPr/>
+                </a:tc>
+                <a:tc>
+                  <a:txBody>
+                    <a:bodyPr/>
+                    <a:lstStyle/>
+                    <a:p>
+                      <a:r>
+                        <a:rPr lang="en-GB" sz="1600" dirty="0">
+                          <a:latin typeface="+mn-lt"/>
+                          <a:ea typeface="Menlo" panose="020B0609030804020204" pitchFamily="49" charset="0"/>
+                          <a:cs typeface="Menlo" panose="020B0609030804020204" pitchFamily="49" charset="0"/>
+                        </a:rPr>
+                        <a:t>Index range</a:t>
+                      </a:r>
+                    </a:p>
+                  </a:txBody>
+                  <a:tcPr/>
+                </a:tc>
+                <a:tc>
+                  <a:txBody>
+                    <a:bodyPr/>
+                    <a:lstStyle/>
+                    <a:p>
+                      <a:r>
+                        <a:rPr lang="en-GB" sz="1600" dirty="0">
+                          <a:latin typeface="Menlo" panose="020B0609030804020204" pitchFamily="49" charset="0"/>
+                          <a:ea typeface="Menlo" panose="020B0609030804020204" pitchFamily="49" charset="0"/>
+                          <a:cs typeface="Menlo" panose="020B0609030804020204" pitchFamily="49" charset="0"/>
+                        </a:rPr>
+                        <a:t>v9 == 0 until 2</a:t>
+                      </a:r>
+                    </a:p>
+                  </a:txBody>
+                  <a:tcPr/>
+                </a:tc>
+                <a:extLst>
+                  <a:ext uri="{0D108BD9-81ED-4DB2-BD59-A6C34878D82A}">
+                    <a16:rowId xmlns:a16="http://schemas.microsoft.com/office/drawing/2014/main" val="2272205396"/>
+                  </a:ext>
+                </a:extLst>
+              </a:tr>
+            </a:tbl>
+          </a:graphicData>
+        </a:graphic>
+      </p:graphicFrame>
+      <p:sp>
+        <p:nvSpPr>
+          <p:cNvPr id="7" name="TextBox 6">
+            <a:extLst>
+              <a:ext uri="{FF2B5EF4-FFF2-40B4-BE49-F238E27FC236}">
+                <a16:creationId xmlns:a16="http://schemas.microsoft.com/office/drawing/2014/main" id="{32233293-4518-E698-A6E9-76A4BE07BC63}"/>
+              </a:ext>
+            </a:extLst>
+          </p:cNvPr>
+          <p:cNvSpPr txBox="1"/>
+          <p:nvPr/>
+        </p:nvSpPr>
+        <p:spPr>
+          <a:xfrm>
+            <a:off x="533400" y="6290846"/>
+            <a:ext cx="5624040" cy="338554"/>
+          </a:xfrm>
+          <a:prstGeom prst="rect">
+            <a:avLst/>
+          </a:prstGeom>
+          <a:noFill/>
+        </p:spPr>
+        <p:txBody>
+          <a:bodyPr wrap="none" rtlCol="0">
+            <a:spAutoFit/>
+          </a:bodyPr>
+          <a:lstStyle/>
+          <a:p>
+            <a:r>
+              <a:rPr lang="en-GB" sz="1600" dirty="0"/>
+              <a:t>The type ISZ[T] denotes sequences with elements of type T</a:t>
+            </a:r>
+          </a:p>
+        </p:txBody>
+      </p:sp>
     </p:spTree>
     <p:extLst>
       <p:ext uri="{BB962C8B-B14F-4D97-AF65-F5344CB8AC3E}">
         <p14:creationId xmlns:p14="http://schemas.microsoft.com/office/powerpoint/2010/main" val="974532288"/>
+      </p:ext>
+    </p:extLst>
+  </p:cSld>
+  <p:clrMapOvr>
+    <a:masterClrMapping/>
+  </p:clrMapOvr>
+</p:sld>
+</file>
+
+<file path=ppt/slides/slide3.xml><?xml version="1.0" encoding="utf-8"?>
+<p:sld xmlns:a="http://schemas.openxmlformats.org/drawingml/2006/main" xmlns:r="http://schemas.openxmlformats.org/officeDocument/2006/relationships" xmlns:p="http://schemas.openxmlformats.org/presentationml/2006/main">
+  <p:cSld>
+    <p:spTree>
+      <p:nvGrpSpPr>
+        <p:cNvPr id="1" name="">
+          <a:extLst>
+            <a:ext uri="{FF2B5EF4-FFF2-40B4-BE49-F238E27FC236}">
+              <a16:creationId xmlns:a16="http://schemas.microsoft.com/office/drawing/2014/main" id="{7006B59D-AD6C-5824-AAE3-DF6D8B529E9F}"/>
+            </a:ext>
+          </a:extLst>
+        </p:cNvPr>
+        <p:cNvGrpSpPr/>
+        <p:nvPr/>
+      </p:nvGrpSpPr>
+      <p:grpSpPr>
+        <a:xfrm>
+          <a:off x="0" y="0"/>
+          <a:ext cx="0" cy="0"/>
+          <a:chOff x="0" y="0"/>
+          <a:chExt cx="0" cy="0"/>
+        </a:xfrm>
+      </p:grpSpPr>
+      <p:sp>
+        <p:nvSpPr>
+          <p:cNvPr id="2" name="Title 1">
+            <a:extLst>
+              <a:ext uri="{FF2B5EF4-FFF2-40B4-BE49-F238E27FC236}">
+                <a16:creationId xmlns:a16="http://schemas.microsoft.com/office/drawing/2014/main" id="{CF5941B5-5FAF-443F-96CF-B03DF4724D88}"/>
+              </a:ext>
+            </a:extLst>
+          </p:cNvPr>
+          <p:cNvSpPr>
+            <a:spLocks noGrp="1"/>
+          </p:cNvSpPr>
+          <p:nvPr>
+            <p:ph type="title"/>
+          </p:nvPr>
+        </p:nvSpPr>
+        <p:spPr/>
+        <p:txBody>
+          <a:bodyPr/>
+          <a:lstStyle/>
+          <a:p>
+            <a:r>
+              <a:rPr lang="en-US" sz="3600" dirty="0"/>
+              <a:t>Sequences</a:t>
+            </a:r>
+          </a:p>
+        </p:txBody>
+      </p:sp>
+      <p:sp>
+        <p:nvSpPr>
+          <p:cNvPr id="128" name="Slide Number Placeholder 127">
+            <a:extLst>
+              <a:ext uri="{FF2B5EF4-FFF2-40B4-BE49-F238E27FC236}">
+                <a16:creationId xmlns:a16="http://schemas.microsoft.com/office/drawing/2014/main" id="{7C7FD0E4-2CCB-3EE1-7B1F-80CA36F2E287}"/>
+              </a:ext>
+            </a:extLst>
+          </p:cNvPr>
+          <p:cNvSpPr>
+            <a:spLocks noGrp="1"/>
+          </p:cNvSpPr>
+          <p:nvPr>
+            <p:ph type="sldNum" sz="quarter" idx="11"/>
+          </p:nvPr>
+        </p:nvSpPr>
+        <p:spPr/>
+        <p:txBody>
+          <a:bodyPr/>
+          <a:lstStyle/>
+          <a:p>
+            <a:pPr>
+              <a:defRPr/>
+            </a:pPr>
+            <a:fld id="{6E0AA622-F4CE-604D-A669-CD3D12FC535C}" type="slidenum">
+              <a:rPr lang="en-US" smtClean="0"/>
+              <a:pPr>
+                <a:defRPr/>
+              </a:pPr>
+              <a:t>3</a:t>
+            </a:fld>
+            <a:endParaRPr lang="en-US" dirty="0"/>
+          </a:p>
+        </p:txBody>
+      </p:sp>
+      <p:sp>
+        <p:nvSpPr>
+          <p:cNvPr id="3" name="TextBox 2">
+            <a:extLst>
+              <a:ext uri="{FF2B5EF4-FFF2-40B4-BE49-F238E27FC236}">
+                <a16:creationId xmlns:a16="http://schemas.microsoft.com/office/drawing/2014/main" id="{9D806E92-0329-EE3F-FC38-CD2CD2662C31}"/>
+              </a:ext>
+            </a:extLst>
+          </p:cNvPr>
+          <p:cNvSpPr txBox="1"/>
+          <p:nvPr/>
+        </p:nvSpPr>
+        <p:spPr>
+          <a:xfrm>
+            <a:off x="381000" y="1158925"/>
+            <a:ext cx="8016766" cy="338554"/>
+          </a:xfrm>
+          <a:prstGeom prst="rect">
+            <a:avLst/>
+          </a:prstGeom>
+          <a:gradFill flip="none" rotWithShape="1">
+            <a:gsLst>
+              <a:gs pos="0">
+                <a:schemeClr val="bg1"/>
+              </a:gs>
+              <a:gs pos="74000">
+                <a:srgbClr val="FFE267"/>
+              </a:gs>
+              <a:gs pos="83000">
+                <a:srgbClr val="FFE267"/>
+              </a:gs>
+              <a:gs pos="100000">
+                <a:srgbClr val="FFE267"/>
+              </a:gs>
+            </a:gsLst>
+            <a:lin ang="10800000" scaled="1"/>
+            <a:tileRect/>
+          </a:gradFill>
+        </p:spPr>
+        <p:txBody>
+          <a:bodyPr wrap="square" rtlCol="0">
+            <a:spAutoFit/>
+          </a:bodyPr>
+          <a:lstStyle/>
+          <a:p>
+            <a:r>
+              <a:rPr lang="en-US" sz="1600" dirty="0"/>
+              <a:t>Access to elements of a sequence</a:t>
+            </a:r>
+          </a:p>
+        </p:txBody>
+      </p:sp>
+      <p:pic>
+        <p:nvPicPr>
+          <p:cNvPr id="5" name="Picture 4" descr="A close-up of a number&#10;&#10;Description automatically generated">
+            <a:extLst>
+              <a:ext uri="{FF2B5EF4-FFF2-40B4-BE49-F238E27FC236}">
+                <a16:creationId xmlns:a16="http://schemas.microsoft.com/office/drawing/2014/main" id="{C8D9ABC0-CE1F-5E68-9E2E-06FA32A3AE88}"/>
+              </a:ext>
+            </a:extLst>
+          </p:cNvPr>
+          <p:cNvPicPr>
+            <a:picLocks noChangeAspect="1"/>
+          </p:cNvPicPr>
+          <p:nvPr/>
+        </p:nvPicPr>
+        <p:blipFill>
+          <a:blip r:embed="rId3"/>
+          <a:stretch>
+            <a:fillRect/>
+          </a:stretch>
+        </p:blipFill>
+        <p:spPr>
+          <a:xfrm>
+            <a:off x="574964" y="1828800"/>
+            <a:ext cx="4152900" cy="1193800"/>
+          </a:xfrm>
+          <a:prstGeom prst="rect">
+            <a:avLst/>
+          </a:prstGeom>
+        </p:spPr>
+      </p:pic>
+      <p:sp>
+        <p:nvSpPr>
+          <p:cNvPr id="6" name="Rounded Rectangular Callout 5">
+            <a:extLst>
+              <a:ext uri="{FF2B5EF4-FFF2-40B4-BE49-F238E27FC236}">
+                <a16:creationId xmlns:a16="http://schemas.microsoft.com/office/drawing/2014/main" id="{82841D6D-664E-34D4-8B78-740BBA8B2844}"/>
+              </a:ext>
+            </a:extLst>
+          </p:cNvPr>
+          <p:cNvSpPr/>
+          <p:nvPr/>
+        </p:nvSpPr>
+        <p:spPr bwMode="auto">
+          <a:xfrm>
+            <a:off x="1440000" y="2988000"/>
+            <a:ext cx="5943600" cy="406401"/>
+          </a:xfrm>
+          <a:prstGeom prst="wedgeRoundRectCallout">
+            <a:avLst>
+              <a:gd name="adj1" fmla="val -52092"/>
+              <a:gd name="adj2" fmla="val -45738"/>
+              <a:gd name="adj3" fmla="val 16667"/>
+            </a:avLst>
+          </a:prstGeom>
+          <a:solidFill>
+            <a:schemeClr val="accent1">
+              <a:lumMod val="20000"/>
+              <a:lumOff val="80000"/>
+            </a:schemeClr>
+          </a:solidFill>
+          <a:ln w="9525" cap="flat" cmpd="sng" algn="ctr">
+            <a:solidFill>
+              <a:schemeClr val="tx1"/>
+            </a:solidFill>
+            <a:prstDash val="solid"/>
+            <a:miter lim="800000"/>
+            <a:headEnd type="none" w="med" len="med"/>
+            <a:tailEnd type="none" w="med" len="med"/>
+          </a:ln>
+          <a:effectLst/>
+        </p:spPr>
+        <p:txBody>
+          <a:bodyPr vert="horz" wrap="none" lIns="91440" tIns="45720" rIns="91440" bIns="45720" numCol="1" rtlCol="0" anchor="ctr" anchorCtr="0" compatLnSpc="1">
+            <a:prstTxWarp prst="textNoShape">
+              <a:avLst/>
+            </a:prstTxWarp>
+          </a:bodyPr>
+          <a:lstStyle/>
+          <a:p>
+            <a:pPr marL="0" marR="0" indent="0" algn="l" defTabSz="914400" rtl="0" eaLnBrk="1" fontAlgn="base" latinLnBrk="0" hangingPunct="1">
+              <a:lnSpc>
+                <a:spcPct val="100000"/>
+              </a:lnSpc>
+              <a:spcBef>
+                <a:spcPct val="0"/>
+              </a:spcBef>
+              <a:spcAft>
+                <a:spcPct val="0"/>
+              </a:spcAft>
+              <a:buClrTx/>
+              <a:buSzTx/>
+              <a:buFontTx/>
+              <a:buNone/>
+              <a:tabLst/>
+            </a:pPr>
+            <a:r>
+              <a:rPr kumimoji="0" lang="en-GB" sz="1800" b="0" i="0" u="none" strike="noStrike" cap="none" normalizeH="0" baseline="0" dirty="0">
+                <a:ln>
+                  <a:noFill/>
+                </a:ln>
+                <a:solidFill>
+                  <a:schemeClr val="tx1"/>
+                </a:solidFill>
+                <a:effectLst/>
+                <a:latin typeface="Tahoma" charset="0"/>
+              </a:rPr>
+              <a:t>Could not deduce that the sequence indexing is in bound</a:t>
+            </a:r>
+          </a:p>
+        </p:txBody>
+      </p:sp>
+      <p:pic>
+        <p:nvPicPr>
+          <p:cNvPr id="8" name="Picture 7" descr="A black and red symbol with a red line&#10;&#10;Description automatically generated">
+            <a:extLst>
+              <a:ext uri="{FF2B5EF4-FFF2-40B4-BE49-F238E27FC236}">
+                <a16:creationId xmlns:a16="http://schemas.microsoft.com/office/drawing/2014/main" id="{599BD23C-FC7A-CC33-FE74-92E6A0E1398C}"/>
+              </a:ext>
+            </a:extLst>
+          </p:cNvPr>
+          <p:cNvPicPr>
+            <a:picLocks noChangeAspect="1"/>
+          </p:cNvPicPr>
+          <p:nvPr/>
+        </p:nvPicPr>
+        <p:blipFill>
+          <a:blip r:embed="rId4"/>
+          <a:stretch>
+            <a:fillRect/>
+          </a:stretch>
+        </p:blipFill>
+        <p:spPr>
+          <a:xfrm>
+            <a:off x="1728000" y="4025603"/>
+            <a:ext cx="1181100" cy="355600"/>
+          </a:xfrm>
+          <a:prstGeom prst="rect">
+            <a:avLst/>
+          </a:prstGeom>
+        </p:spPr>
+      </p:pic>
+      <p:sp>
+        <p:nvSpPr>
+          <p:cNvPr id="9" name="TextBox 8">
+            <a:extLst>
+              <a:ext uri="{FF2B5EF4-FFF2-40B4-BE49-F238E27FC236}">
+                <a16:creationId xmlns:a16="http://schemas.microsoft.com/office/drawing/2014/main" id="{2C0B7017-408D-C606-0C85-2A3DFF08AC0C}"/>
+              </a:ext>
+            </a:extLst>
+          </p:cNvPr>
+          <p:cNvSpPr txBox="1"/>
+          <p:nvPr/>
+        </p:nvSpPr>
+        <p:spPr>
+          <a:xfrm>
+            <a:off x="3200400" y="3997134"/>
+            <a:ext cx="3657600" cy="369332"/>
+          </a:xfrm>
+          <a:prstGeom prst="rect">
+            <a:avLst/>
+          </a:prstGeom>
+          <a:noFill/>
+        </p:spPr>
+        <p:txBody>
+          <a:bodyPr wrap="square" rtlCol="0">
+            <a:spAutoFit/>
+          </a:bodyPr>
+          <a:lstStyle/>
+          <a:p>
+            <a:r>
+              <a:rPr lang="en-GB" sz="1800" dirty="0">
+                <a:solidFill>
+                  <a:srgbClr val="8922FD"/>
+                </a:solidFill>
+              </a:rPr>
+              <a:t>ISZ[T] sequences are </a:t>
+            </a:r>
+            <a:r>
+              <a:rPr lang="en-GB" sz="1800" b="1" dirty="0">
+                <a:solidFill>
+                  <a:srgbClr val="8922FD"/>
+                </a:solidFill>
+              </a:rPr>
+              <a:t>immutable</a:t>
+            </a:r>
+            <a:r>
+              <a:rPr lang="en-GB" sz="1800" dirty="0">
+                <a:solidFill>
+                  <a:srgbClr val="8922FD"/>
+                </a:solidFill>
+              </a:rPr>
+              <a:t> </a:t>
+            </a:r>
+          </a:p>
+        </p:txBody>
+      </p:sp>
+      <p:sp>
+        <p:nvSpPr>
+          <p:cNvPr id="10" name="TextBox 9">
+            <a:extLst>
+              <a:ext uri="{FF2B5EF4-FFF2-40B4-BE49-F238E27FC236}">
+                <a16:creationId xmlns:a16="http://schemas.microsoft.com/office/drawing/2014/main" id="{B2131B85-16C5-81A4-DC40-4B1F24FB2606}"/>
+              </a:ext>
+            </a:extLst>
+          </p:cNvPr>
+          <p:cNvSpPr txBox="1"/>
+          <p:nvPr/>
+        </p:nvSpPr>
+        <p:spPr>
+          <a:xfrm>
+            <a:off x="1440000" y="5015740"/>
+            <a:ext cx="5660267" cy="369332"/>
+          </a:xfrm>
+          <a:prstGeom prst="rect">
+            <a:avLst/>
+          </a:prstGeom>
+          <a:noFill/>
+        </p:spPr>
+        <p:txBody>
+          <a:bodyPr wrap="none" rtlCol="0">
+            <a:spAutoFit/>
+          </a:bodyPr>
+          <a:lstStyle/>
+          <a:p>
+            <a:r>
+              <a:rPr lang="en-GB" sz="1800" b="1" dirty="0">
+                <a:solidFill>
+                  <a:srgbClr val="8922FD"/>
+                </a:solidFill>
+              </a:rPr>
+              <a:t>Mutable</a:t>
+            </a:r>
+            <a:r>
+              <a:rPr lang="en-GB" sz="1800" dirty="0">
+                <a:solidFill>
+                  <a:srgbClr val="8922FD"/>
+                </a:solidFill>
+              </a:rPr>
+              <a:t> sequences are provided by the type MSZ[T]</a:t>
+            </a:r>
+          </a:p>
+        </p:txBody>
+      </p:sp>
+      <p:pic>
+        <p:nvPicPr>
+          <p:cNvPr id="12" name="Picture 11" descr="A close up of a number&#10;&#10;Description automatically generated">
+            <a:extLst>
+              <a:ext uri="{FF2B5EF4-FFF2-40B4-BE49-F238E27FC236}">
+                <a16:creationId xmlns:a16="http://schemas.microsoft.com/office/drawing/2014/main" id="{7CACAEB2-C505-54E0-9766-524799305445}"/>
+              </a:ext>
+            </a:extLst>
+          </p:cNvPr>
+          <p:cNvPicPr>
+            <a:picLocks noChangeAspect="1"/>
+          </p:cNvPicPr>
+          <p:nvPr/>
+        </p:nvPicPr>
+        <p:blipFill>
+          <a:blip r:embed="rId5"/>
+          <a:stretch>
+            <a:fillRect/>
+          </a:stretch>
+        </p:blipFill>
+        <p:spPr>
+          <a:xfrm>
+            <a:off x="574964" y="5410200"/>
+            <a:ext cx="4025900" cy="800100"/>
+          </a:xfrm>
+          <a:prstGeom prst="rect">
+            <a:avLst/>
+          </a:prstGeom>
+        </p:spPr>
+      </p:pic>
+    </p:spTree>
+    <p:extLst>
+      <p:ext uri="{BB962C8B-B14F-4D97-AF65-F5344CB8AC3E}">
+        <p14:creationId xmlns:p14="http://schemas.microsoft.com/office/powerpoint/2010/main" val="3341106800"/>
+      </p:ext>
+    </p:extLst>
+  </p:cSld>
+  <p:clrMapOvr>
+    <a:masterClrMapping/>
+  </p:clrMapOvr>
+  <p:timing>
+    <p:tnLst>
+      <p:par>
+        <p:cTn id="1" dur="indefinite" restart="never" nodeType="tmRoot">
+          <p:childTnLst>
+            <p:seq concurrent="1" nextAc="seek">
+              <p:cTn id="2" dur="indefinite" nodeType="mainSeq">
+                <p:childTnLst>
+                  <p:par>
+                    <p:cTn id="3" fill="hold">
+                      <p:stCondLst>
+                        <p:cond delay="indefinite"/>
+                      </p:stCondLst>
+                      <p:childTnLst>
+                        <p:par>
+                          <p:cTn id="4" fill="hold">
+                            <p:stCondLst>
+                              <p:cond delay="0"/>
+                            </p:stCondLst>
+                            <p:childTnLst>
+                              <p:par>
+                                <p:cTn id="5" presetID="1" presetClass="entr" presetSubtype="0" fill="hold" grpId="0" nodeType="clickEffect">
+                                  <p:stCondLst>
+                                    <p:cond delay="0"/>
+                                  </p:stCondLst>
+                                  <p:childTnLst>
+                                    <p:set>
+                                      <p:cBhvr>
+                                        <p:cTn id="6" dur="1" fill="hold">
+                                          <p:stCondLst>
+                                            <p:cond delay="0"/>
+                                          </p:stCondLst>
+                                        </p:cTn>
+                                        <p:tgtEl>
+                                          <p:spTgt spid="6"/>
+                                        </p:tgtEl>
+                                        <p:attrNameLst>
+                                          <p:attrName>style.visibility</p:attrName>
+                                        </p:attrNameLst>
+                                      </p:cBhvr>
+                                      <p:to>
+                                        <p:strVal val="visible"/>
+                                      </p:to>
+                                    </p:set>
+                                  </p:childTnLst>
+                                </p:cTn>
+                              </p:par>
+                            </p:childTnLst>
+                          </p:cTn>
+                        </p:par>
+                      </p:childTnLst>
+                    </p:cTn>
+                  </p:par>
+                  <p:par>
+                    <p:cTn id="7" fill="hold">
+                      <p:stCondLst>
+                        <p:cond delay="indefinite"/>
+                      </p:stCondLst>
+                      <p:childTnLst>
+                        <p:par>
+                          <p:cTn id="8" fill="hold">
+                            <p:stCondLst>
+                              <p:cond delay="0"/>
+                            </p:stCondLst>
+                            <p:childTnLst>
+                              <p:par>
+                                <p:cTn id="9" presetID="1" presetClass="entr" presetSubtype="0" fill="hold" nodeType="clickEffect">
+                                  <p:stCondLst>
+                                    <p:cond delay="0"/>
+                                  </p:stCondLst>
+                                  <p:childTnLst>
+                                    <p:set>
+                                      <p:cBhvr>
+                                        <p:cTn id="10" dur="1" fill="hold">
+                                          <p:stCondLst>
+                                            <p:cond delay="0"/>
+                                          </p:stCondLst>
+                                        </p:cTn>
+                                        <p:tgtEl>
+                                          <p:spTgt spid="8"/>
+                                        </p:tgtEl>
+                                        <p:attrNameLst>
+                                          <p:attrName>style.visibility</p:attrName>
+                                        </p:attrNameLst>
+                                      </p:cBhvr>
+                                      <p:to>
+                                        <p:strVal val="visible"/>
+                                      </p:to>
+                                    </p:set>
+                                  </p:childTnLst>
+                                </p:cTn>
+                              </p:par>
+                            </p:childTnLst>
+                          </p:cTn>
+                        </p:par>
+                      </p:childTnLst>
+                    </p:cTn>
+                  </p:par>
+                  <p:par>
+                    <p:cTn id="11" fill="hold">
+                      <p:stCondLst>
+                        <p:cond delay="indefinite"/>
+                      </p:stCondLst>
+                      <p:childTnLst>
+                        <p:par>
+                          <p:cTn id="12" fill="hold">
+                            <p:stCondLst>
+                              <p:cond delay="0"/>
+                            </p:stCondLst>
+                            <p:childTnLst>
+                              <p:par>
+                                <p:cTn id="13" presetID="1" presetClass="entr" presetSubtype="0" fill="hold" grpId="0" nodeType="clickEffect">
+                                  <p:stCondLst>
+                                    <p:cond delay="0"/>
+                                  </p:stCondLst>
+                                  <p:childTnLst>
+                                    <p:set>
+                                      <p:cBhvr>
+                                        <p:cTn id="14" dur="1" fill="hold">
+                                          <p:stCondLst>
+                                            <p:cond delay="0"/>
+                                          </p:stCondLst>
+                                        </p:cTn>
+                                        <p:tgtEl>
+                                          <p:spTgt spid="9"/>
+                                        </p:tgtEl>
+                                        <p:attrNameLst>
+                                          <p:attrName>style.visibility</p:attrName>
+                                        </p:attrNameLst>
+                                      </p:cBhvr>
+                                      <p:to>
+                                        <p:strVal val="visible"/>
+                                      </p:to>
+                                    </p:set>
+                                  </p:childTnLst>
+                                </p:cTn>
+                              </p:par>
+                            </p:childTnLst>
+                          </p:cTn>
+                        </p:par>
+                      </p:childTnLst>
+                    </p:cTn>
+                  </p:par>
+                  <p:par>
+                    <p:cTn id="15" fill="hold">
+                      <p:stCondLst>
+                        <p:cond delay="indefinite"/>
+                      </p:stCondLst>
+                      <p:childTnLst>
+                        <p:par>
+                          <p:cTn id="16" fill="hold">
+                            <p:stCondLst>
+                              <p:cond delay="0"/>
+                            </p:stCondLst>
+                            <p:childTnLst>
+                              <p:par>
+                                <p:cTn id="17" presetID="1" presetClass="entr" presetSubtype="0" fill="hold" grpId="0" nodeType="clickEffect">
+                                  <p:stCondLst>
+                                    <p:cond delay="0"/>
+                                  </p:stCondLst>
+                                  <p:childTnLst>
+                                    <p:set>
+                                      <p:cBhvr>
+                                        <p:cTn id="18" dur="1" fill="hold">
+                                          <p:stCondLst>
+                                            <p:cond delay="0"/>
+                                          </p:stCondLst>
+                                        </p:cTn>
+                                        <p:tgtEl>
+                                          <p:spTgt spid="10"/>
+                                        </p:tgtEl>
+                                        <p:attrNameLst>
+                                          <p:attrName>style.visibility</p:attrName>
+                                        </p:attrNameLst>
+                                      </p:cBhvr>
+                                      <p:to>
+                                        <p:strVal val="visible"/>
+                                      </p:to>
+                                    </p:set>
+                                  </p:childTnLst>
+                                </p:cTn>
+                              </p:par>
+                              <p:par>
+                                <p:cTn id="19" presetID="1" presetClass="entr" presetSubtype="0" fill="hold" nodeType="withEffect">
+                                  <p:stCondLst>
+                                    <p:cond delay="0"/>
+                                  </p:stCondLst>
+                                  <p:childTnLst>
+                                    <p:set>
+                                      <p:cBhvr>
+                                        <p:cTn id="20" dur="1" fill="hold">
+                                          <p:stCondLst>
+                                            <p:cond delay="0"/>
+                                          </p:stCondLst>
+                                        </p:cTn>
+                                        <p:tgtEl>
+                                          <p:spTgt spid="12"/>
+                                        </p:tgtEl>
+                                        <p:attrNameLst>
+                                          <p:attrName>style.visibility</p:attrName>
+                                        </p:attrNameLst>
+                                      </p:cBhvr>
+                                      <p:to>
+                                        <p:strVal val="visible"/>
+                                      </p:to>
+                                    </p:set>
+                                  </p:childTnLst>
+                                </p:cTn>
+                              </p:par>
+                            </p:childTnLst>
+                          </p:cTn>
+                        </p:par>
+                      </p:childTnLst>
+                    </p:cTn>
+                  </p:par>
+                </p:childTnLst>
+              </p:cTn>
+              <p:prevCondLst>
+                <p:cond evt="onPrev" delay="0">
+                  <p:tgtEl>
+                    <p:sldTgt/>
+                  </p:tgtEl>
+                </p:cond>
+              </p:prevCondLst>
+              <p:nextCondLst>
+                <p:cond evt="onNext" delay="0">
+                  <p:tgtEl>
+                    <p:sldTgt/>
+                  </p:tgtEl>
+                </p:cond>
+              </p:nextCondLst>
+            </p:seq>
+          </p:childTnLst>
+        </p:cTn>
+      </p:par>
+    </p:tnLst>
+    <p:bldLst>
+      <p:bldP spid="6" grpId="0" animBg="1"/>
+      <p:bldP spid="9" grpId="0"/>
+      <p:bldP spid="10" grpId="0"/>
+    </p:bldLst>
+  </p:timing>
+</p:sld>
+</file>
+
+<file path=ppt/slides/slide4.xml><?xml version="1.0" encoding="utf-8"?>
+<p:sld xmlns:a="http://schemas.openxmlformats.org/drawingml/2006/main" xmlns:r="http://schemas.openxmlformats.org/officeDocument/2006/relationships" xmlns:p="http://schemas.openxmlformats.org/presentationml/2006/main">
+  <p:cSld>
+    <p:spTree>
+      <p:nvGrpSpPr>
+        <p:cNvPr id="1" name="">
+          <a:extLst>
+            <a:ext uri="{FF2B5EF4-FFF2-40B4-BE49-F238E27FC236}">
+              <a16:creationId xmlns:a16="http://schemas.microsoft.com/office/drawing/2014/main" id="{D8E4630E-C6BA-1447-51D2-319D0E9F2C79}"/>
+            </a:ext>
+          </a:extLst>
+        </p:cNvPr>
+        <p:cNvGrpSpPr/>
+        <p:nvPr/>
+      </p:nvGrpSpPr>
+      <p:grpSpPr>
+        <a:xfrm>
+          <a:off x="0" y="0"/>
+          <a:ext cx="0" cy="0"/>
+          <a:chOff x="0" y="0"/>
+          <a:chExt cx="0" cy="0"/>
+        </a:xfrm>
+      </p:grpSpPr>
+      <p:sp>
+        <p:nvSpPr>
+          <p:cNvPr id="2" name="Title 1">
+            <a:extLst>
+              <a:ext uri="{FF2B5EF4-FFF2-40B4-BE49-F238E27FC236}">
+                <a16:creationId xmlns:a16="http://schemas.microsoft.com/office/drawing/2014/main" id="{51F914E3-FB3D-7025-667C-AD98D9789486}"/>
+              </a:ext>
+            </a:extLst>
+          </p:cNvPr>
+          <p:cNvSpPr>
+            <a:spLocks noGrp="1"/>
+          </p:cNvSpPr>
+          <p:nvPr>
+            <p:ph type="title"/>
+          </p:nvPr>
+        </p:nvSpPr>
+        <p:spPr/>
+        <p:txBody>
+          <a:bodyPr/>
+          <a:lstStyle/>
+          <a:p>
+            <a:r>
+              <a:rPr lang="en-US" sz="3600" dirty="0"/>
+              <a:t>Sequences</a:t>
+            </a:r>
+          </a:p>
+        </p:txBody>
+      </p:sp>
+      <p:sp>
+        <p:nvSpPr>
+          <p:cNvPr id="128" name="Slide Number Placeholder 127">
+            <a:extLst>
+              <a:ext uri="{FF2B5EF4-FFF2-40B4-BE49-F238E27FC236}">
+                <a16:creationId xmlns:a16="http://schemas.microsoft.com/office/drawing/2014/main" id="{97ADC599-81CB-4F15-28CA-7C9BAA8A07D3}"/>
+              </a:ext>
+            </a:extLst>
+          </p:cNvPr>
+          <p:cNvSpPr>
+            <a:spLocks noGrp="1"/>
+          </p:cNvSpPr>
+          <p:nvPr>
+            <p:ph type="sldNum" sz="quarter" idx="11"/>
+          </p:nvPr>
+        </p:nvSpPr>
+        <p:spPr/>
+        <p:txBody>
+          <a:bodyPr/>
+          <a:lstStyle/>
+          <a:p>
+            <a:pPr>
+              <a:defRPr/>
+            </a:pPr>
+            <a:fld id="{6E0AA622-F4CE-604D-A669-CD3D12FC535C}" type="slidenum">
+              <a:rPr lang="en-US" smtClean="0"/>
+              <a:pPr>
+                <a:defRPr/>
+              </a:pPr>
+              <a:t>4</a:t>
+            </a:fld>
+            <a:endParaRPr lang="en-US" dirty="0"/>
+          </a:p>
+        </p:txBody>
+      </p:sp>
+      <p:sp>
+        <p:nvSpPr>
+          <p:cNvPr id="3" name="TextBox 2">
+            <a:extLst>
+              <a:ext uri="{FF2B5EF4-FFF2-40B4-BE49-F238E27FC236}">
+                <a16:creationId xmlns:a16="http://schemas.microsoft.com/office/drawing/2014/main" id="{4539654D-4B4F-41C6-8EF9-9C5E52757638}"/>
+              </a:ext>
+            </a:extLst>
+          </p:cNvPr>
+          <p:cNvSpPr txBox="1"/>
+          <p:nvPr/>
+        </p:nvSpPr>
+        <p:spPr>
+          <a:xfrm>
+            <a:off x="381000" y="1158925"/>
+            <a:ext cx="8016766" cy="338554"/>
+          </a:xfrm>
+          <a:prstGeom prst="rect">
+            <a:avLst/>
+          </a:prstGeom>
+          <a:gradFill flip="none" rotWithShape="1">
+            <a:gsLst>
+              <a:gs pos="0">
+                <a:schemeClr val="bg1"/>
+              </a:gs>
+              <a:gs pos="74000">
+                <a:srgbClr val="FFE267"/>
+              </a:gs>
+              <a:gs pos="83000">
+                <a:srgbClr val="FFE267"/>
+              </a:gs>
+              <a:gs pos="100000">
+                <a:srgbClr val="FFE267"/>
+              </a:gs>
+            </a:gsLst>
+            <a:lin ang="10800000" scaled="1"/>
+            <a:tileRect/>
+          </a:gradFill>
+        </p:spPr>
+        <p:txBody>
+          <a:bodyPr wrap="square" rtlCol="0">
+            <a:spAutoFit/>
+          </a:bodyPr>
+          <a:lstStyle/>
+          <a:p>
+            <a:r>
+              <a:rPr lang="en-US" sz="1600" dirty="0"/>
+              <a:t>Quantification</a:t>
+            </a:r>
+          </a:p>
+        </p:txBody>
+      </p:sp>
+      <p:pic>
+        <p:nvPicPr>
+          <p:cNvPr id="5" name="Picture 4">
+            <a:extLst>
+              <a:ext uri="{FF2B5EF4-FFF2-40B4-BE49-F238E27FC236}">
+                <a16:creationId xmlns:a16="http://schemas.microsoft.com/office/drawing/2014/main" id="{F54282B0-235F-3B4B-F9DC-3C30A8A26DC5}"/>
+              </a:ext>
+            </a:extLst>
+          </p:cNvPr>
+          <p:cNvPicPr>
+            <a:picLocks noChangeAspect="1"/>
+          </p:cNvPicPr>
+          <p:nvPr/>
+        </p:nvPicPr>
+        <p:blipFill>
+          <a:blip r:embed="rId3"/>
+          <a:stretch>
+            <a:fillRect/>
+          </a:stretch>
+        </p:blipFill>
+        <p:spPr>
+          <a:xfrm>
+            <a:off x="533400" y="2362200"/>
+            <a:ext cx="6870700" cy="774700"/>
+          </a:xfrm>
+          <a:prstGeom prst="rect">
+            <a:avLst/>
+          </a:prstGeom>
+        </p:spPr>
+      </p:pic>
+      <p:pic>
+        <p:nvPicPr>
+          <p:cNvPr id="7" name="Picture 6">
+            <a:extLst>
+              <a:ext uri="{FF2B5EF4-FFF2-40B4-BE49-F238E27FC236}">
+                <a16:creationId xmlns:a16="http://schemas.microsoft.com/office/drawing/2014/main" id="{4DE0F002-4F01-77F1-364C-A6C1B41F2BE4}"/>
+              </a:ext>
+            </a:extLst>
+          </p:cNvPr>
+          <p:cNvPicPr>
+            <a:picLocks noChangeAspect="1"/>
+          </p:cNvPicPr>
+          <p:nvPr/>
+        </p:nvPicPr>
+        <p:blipFill>
+          <a:blip r:embed="rId4"/>
+          <a:stretch>
+            <a:fillRect/>
+          </a:stretch>
+        </p:blipFill>
+        <p:spPr>
+          <a:xfrm>
+            <a:off x="533400" y="4572000"/>
+            <a:ext cx="7277100" cy="800100"/>
+          </a:xfrm>
+          <a:prstGeom prst="rect">
+            <a:avLst/>
+          </a:prstGeom>
+        </p:spPr>
+      </p:pic>
+      <p:sp>
+        <p:nvSpPr>
+          <p:cNvPr id="8" name="TextBox 7">
+            <a:extLst>
+              <a:ext uri="{FF2B5EF4-FFF2-40B4-BE49-F238E27FC236}">
+                <a16:creationId xmlns:a16="http://schemas.microsoft.com/office/drawing/2014/main" id="{5011CF0C-C52D-905B-1C66-8F29102619A8}"/>
+              </a:ext>
+            </a:extLst>
+          </p:cNvPr>
+          <p:cNvSpPr txBox="1"/>
+          <p:nvPr/>
+        </p:nvSpPr>
+        <p:spPr>
+          <a:xfrm>
+            <a:off x="533400" y="1949907"/>
+            <a:ext cx="3257623" cy="400110"/>
+          </a:xfrm>
+          <a:prstGeom prst="rect">
+            <a:avLst/>
+          </a:prstGeom>
+          <a:noFill/>
+        </p:spPr>
+        <p:txBody>
+          <a:bodyPr wrap="none" rtlCol="0">
+            <a:spAutoFit/>
+          </a:bodyPr>
+          <a:lstStyle/>
+          <a:p>
+            <a:r>
+              <a:rPr lang="en-GB" sz="2000" b="1" dirty="0">
+                <a:solidFill>
+                  <a:srgbClr val="8922FD"/>
+                </a:solidFill>
+              </a:rPr>
+              <a:t>Universal quantification</a:t>
+            </a:r>
+          </a:p>
+        </p:txBody>
+      </p:sp>
+      <p:sp>
+        <p:nvSpPr>
+          <p:cNvPr id="9" name="TextBox 8">
+            <a:extLst>
+              <a:ext uri="{FF2B5EF4-FFF2-40B4-BE49-F238E27FC236}">
+                <a16:creationId xmlns:a16="http://schemas.microsoft.com/office/drawing/2014/main" id="{4198800E-F099-2BC5-B9EF-65D955BC87A2}"/>
+              </a:ext>
+            </a:extLst>
+          </p:cNvPr>
+          <p:cNvSpPr txBox="1"/>
+          <p:nvPr/>
+        </p:nvSpPr>
+        <p:spPr>
+          <a:xfrm>
+            <a:off x="533400" y="4171890"/>
+            <a:ext cx="3409908" cy="400110"/>
+          </a:xfrm>
+          <a:prstGeom prst="rect">
+            <a:avLst/>
+          </a:prstGeom>
+          <a:noFill/>
+        </p:spPr>
+        <p:txBody>
+          <a:bodyPr wrap="none" rtlCol="0">
+            <a:spAutoFit/>
+          </a:bodyPr>
+          <a:lstStyle/>
+          <a:p>
+            <a:r>
+              <a:rPr lang="en-GB" sz="2000" b="1" dirty="0">
+                <a:solidFill>
+                  <a:srgbClr val="8922FD"/>
+                </a:solidFill>
+              </a:rPr>
+              <a:t>Existential quantification</a:t>
+            </a:r>
+          </a:p>
+        </p:txBody>
+      </p:sp>
+      <p:sp>
+        <p:nvSpPr>
+          <p:cNvPr id="10" name="TextBox 9">
+            <a:extLst>
+              <a:ext uri="{FF2B5EF4-FFF2-40B4-BE49-F238E27FC236}">
+                <a16:creationId xmlns:a16="http://schemas.microsoft.com/office/drawing/2014/main" id="{3BA49C87-9DDE-DB42-E302-801CE4294732}"/>
+              </a:ext>
+            </a:extLst>
+          </p:cNvPr>
+          <p:cNvSpPr txBox="1"/>
+          <p:nvPr/>
+        </p:nvSpPr>
+        <p:spPr>
+          <a:xfrm>
+            <a:off x="2930868" y="3375377"/>
+            <a:ext cx="4926349" cy="369332"/>
+          </a:xfrm>
+          <a:prstGeom prst="rect">
+            <a:avLst/>
+          </a:prstGeom>
+          <a:noFill/>
+        </p:spPr>
+        <p:txBody>
+          <a:bodyPr wrap="none" rtlCol="0">
+            <a:spAutoFit/>
+          </a:bodyPr>
+          <a:lstStyle/>
+          <a:p>
+            <a:r>
+              <a:rPr lang="en-GB" sz="1800" dirty="0">
+                <a:latin typeface="Menlo" panose="020B0609030804020204" pitchFamily="49" charset="0"/>
+                <a:ea typeface="Menlo" panose="020B0609030804020204" pitchFamily="49" charset="0"/>
+                <a:cs typeface="Menlo" panose="020B0609030804020204" pitchFamily="49" charset="0"/>
+              </a:rPr>
+              <a:t>All(</a:t>
+            </a:r>
+            <a:r>
+              <a:rPr lang="en-GB" sz="1800" dirty="0">
+                <a:solidFill>
+                  <a:schemeClr val="bg1">
+                    <a:lumMod val="65000"/>
+                  </a:schemeClr>
+                </a:solidFill>
+                <a:latin typeface="Menlo" panose="020B0609030804020204" pitchFamily="49" charset="0"/>
+                <a:ea typeface="Menlo" panose="020B0609030804020204" pitchFamily="49" charset="0"/>
+                <a:cs typeface="Menlo" panose="020B0609030804020204" pitchFamily="49" charset="0"/>
+              </a:rPr>
+              <a:t>range</a:t>
+            </a:r>
+            <a:r>
+              <a:rPr lang="en-GB" sz="1800" dirty="0">
+                <a:latin typeface="Menlo" panose="020B0609030804020204" pitchFamily="49" charset="0"/>
+                <a:ea typeface="Menlo" panose="020B0609030804020204" pitchFamily="49" charset="0"/>
+                <a:cs typeface="Menlo" panose="020B0609030804020204" pitchFamily="49" charset="0"/>
+              </a:rPr>
+              <a:t>)(</a:t>
+            </a:r>
+            <a:r>
+              <a:rPr lang="en-GB" sz="1800" dirty="0">
+                <a:solidFill>
+                  <a:schemeClr val="bg1">
+                    <a:lumMod val="65000"/>
+                  </a:schemeClr>
+                </a:solidFill>
+                <a:latin typeface="Menlo" panose="020B0609030804020204" pitchFamily="49" charset="0"/>
+                <a:ea typeface="Menlo" panose="020B0609030804020204" pitchFamily="49" charset="0"/>
+                <a:cs typeface="Menlo" panose="020B0609030804020204" pitchFamily="49" charset="0"/>
+              </a:rPr>
+              <a:t>variable</a:t>
+            </a:r>
+            <a:r>
+              <a:rPr lang="en-GB" sz="1800" dirty="0">
+                <a:latin typeface="Menlo" panose="020B0609030804020204" pitchFamily="49" charset="0"/>
+                <a:ea typeface="Menlo" panose="020B0609030804020204" pitchFamily="49" charset="0"/>
+                <a:cs typeface="Menlo" panose="020B0609030804020204" pitchFamily="49" charset="0"/>
+              </a:rPr>
+              <a:t> =&gt; </a:t>
+            </a:r>
+            <a:r>
+              <a:rPr lang="en-GB" sz="1800" dirty="0">
+                <a:solidFill>
+                  <a:schemeClr val="bg1">
+                    <a:lumMod val="65000"/>
+                  </a:schemeClr>
+                </a:solidFill>
+                <a:latin typeface="Menlo" panose="020B0609030804020204" pitchFamily="49" charset="0"/>
+                <a:ea typeface="Menlo" panose="020B0609030804020204" pitchFamily="49" charset="0"/>
+                <a:cs typeface="Menlo" panose="020B0609030804020204" pitchFamily="49" charset="0"/>
+              </a:rPr>
+              <a:t>expression</a:t>
+            </a:r>
+            <a:r>
+              <a:rPr lang="en-GB" sz="1800" dirty="0">
+                <a:latin typeface="Menlo" panose="020B0609030804020204" pitchFamily="49" charset="0"/>
+                <a:ea typeface="Menlo" panose="020B0609030804020204" pitchFamily="49" charset="0"/>
+                <a:cs typeface="Menlo" panose="020B0609030804020204" pitchFamily="49" charset="0"/>
+              </a:rPr>
+              <a:t>)</a:t>
+            </a:r>
+          </a:p>
+        </p:txBody>
+      </p:sp>
+      <p:sp>
+        <p:nvSpPr>
+          <p:cNvPr id="11" name="TextBox 10">
+            <a:extLst>
+              <a:ext uri="{FF2B5EF4-FFF2-40B4-BE49-F238E27FC236}">
+                <a16:creationId xmlns:a16="http://schemas.microsoft.com/office/drawing/2014/main" id="{33A6E06A-DEB0-CBC1-4292-4AC1135185E3}"/>
+              </a:ext>
+            </a:extLst>
+          </p:cNvPr>
+          <p:cNvSpPr txBox="1"/>
+          <p:nvPr/>
+        </p:nvSpPr>
+        <p:spPr>
+          <a:xfrm>
+            <a:off x="2930868" y="5622607"/>
+            <a:ext cx="5344733" cy="369332"/>
+          </a:xfrm>
+          <a:prstGeom prst="rect">
+            <a:avLst/>
+          </a:prstGeom>
+          <a:noFill/>
+        </p:spPr>
+        <p:txBody>
+          <a:bodyPr wrap="none" rtlCol="0">
+            <a:spAutoFit/>
+          </a:bodyPr>
+          <a:lstStyle/>
+          <a:p>
+            <a:r>
+              <a:rPr lang="en-GB" sz="1800" dirty="0">
+                <a:latin typeface="Menlo" panose="020B0609030804020204" pitchFamily="49" charset="0"/>
+                <a:ea typeface="Menlo" panose="020B0609030804020204" pitchFamily="49" charset="0"/>
+                <a:cs typeface="Menlo" panose="020B0609030804020204" pitchFamily="49" charset="0"/>
+              </a:rPr>
+              <a:t>Exists(</a:t>
+            </a:r>
+            <a:r>
+              <a:rPr lang="en-GB" sz="1800" dirty="0">
+                <a:solidFill>
+                  <a:schemeClr val="bg1">
+                    <a:lumMod val="65000"/>
+                  </a:schemeClr>
+                </a:solidFill>
+                <a:latin typeface="Menlo" panose="020B0609030804020204" pitchFamily="49" charset="0"/>
+                <a:ea typeface="Menlo" panose="020B0609030804020204" pitchFamily="49" charset="0"/>
+                <a:cs typeface="Menlo" panose="020B0609030804020204" pitchFamily="49" charset="0"/>
+              </a:rPr>
+              <a:t>range</a:t>
+            </a:r>
+            <a:r>
+              <a:rPr lang="en-GB" sz="1800" dirty="0">
+                <a:latin typeface="Menlo" panose="020B0609030804020204" pitchFamily="49" charset="0"/>
+                <a:ea typeface="Menlo" panose="020B0609030804020204" pitchFamily="49" charset="0"/>
+                <a:cs typeface="Menlo" panose="020B0609030804020204" pitchFamily="49" charset="0"/>
+              </a:rPr>
+              <a:t>)(</a:t>
+            </a:r>
+            <a:r>
+              <a:rPr lang="en-GB" sz="1800" dirty="0">
+                <a:solidFill>
+                  <a:schemeClr val="bg1">
+                    <a:lumMod val="65000"/>
+                  </a:schemeClr>
+                </a:solidFill>
+                <a:latin typeface="Menlo" panose="020B0609030804020204" pitchFamily="49" charset="0"/>
+                <a:ea typeface="Menlo" panose="020B0609030804020204" pitchFamily="49" charset="0"/>
+                <a:cs typeface="Menlo" panose="020B0609030804020204" pitchFamily="49" charset="0"/>
+              </a:rPr>
+              <a:t>variable</a:t>
+            </a:r>
+            <a:r>
+              <a:rPr lang="en-GB" sz="1800" dirty="0">
+                <a:latin typeface="Menlo" panose="020B0609030804020204" pitchFamily="49" charset="0"/>
+                <a:ea typeface="Menlo" panose="020B0609030804020204" pitchFamily="49" charset="0"/>
+                <a:cs typeface="Menlo" panose="020B0609030804020204" pitchFamily="49" charset="0"/>
+              </a:rPr>
+              <a:t> =&gt; </a:t>
+            </a:r>
+            <a:r>
+              <a:rPr lang="en-GB" sz="1800" dirty="0">
+                <a:solidFill>
+                  <a:schemeClr val="bg1">
+                    <a:lumMod val="65000"/>
+                  </a:schemeClr>
+                </a:solidFill>
+                <a:latin typeface="Menlo" panose="020B0609030804020204" pitchFamily="49" charset="0"/>
+                <a:ea typeface="Menlo" panose="020B0609030804020204" pitchFamily="49" charset="0"/>
+                <a:cs typeface="Menlo" panose="020B0609030804020204" pitchFamily="49" charset="0"/>
+              </a:rPr>
+              <a:t>expression</a:t>
+            </a:r>
+            <a:r>
+              <a:rPr lang="en-GB" sz="1800" dirty="0">
+                <a:latin typeface="Menlo" panose="020B0609030804020204" pitchFamily="49" charset="0"/>
+                <a:ea typeface="Menlo" panose="020B0609030804020204" pitchFamily="49" charset="0"/>
+                <a:cs typeface="Menlo" panose="020B0609030804020204" pitchFamily="49" charset="0"/>
+              </a:rPr>
+              <a:t>)</a:t>
+            </a:r>
+          </a:p>
+        </p:txBody>
+      </p:sp>
+    </p:spTree>
+    <p:extLst>
+      <p:ext uri="{BB962C8B-B14F-4D97-AF65-F5344CB8AC3E}">
+        <p14:creationId xmlns:p14="http://schemas.microsoft.com/office/powerpoint/2010/main" val="3429884444"/>
+      </p:ext>
+    </p:extLst>
+  </p:cSld>
+  <p:clrMapOvr>
+    <a:masterClrMapping/>
+  </p:clrMapOvr>
+</p:sld>
+</file>
+
+<file path=ppt/slides/slide5.xml><?xml version="1.0" encoding="utf-8"?>
+<p:sld xmlns:a="http://schemas.openxmlformats.org/drawingml/2006/main" xmlns:r="http://schemas.openxmlformats.org/officeDocument/2006/relationships" xmlns:p="http://schemas.openxmlformats.org/presentationml/2006/main">
+  <p:cSld>
+    <p:spTree>
+      <p:nvGrpSpPr>
+        <p:cNvPr id="1" name="">
+          <a:extLst>
+            <a:ext uri="{FF2B5EF4-FFF2-40B4-BE49-F238E27FC236}">
+              <a16:creationId xmlns:a16="http://schemas.microsoft.com/office/drawing/2014/main" id="{B6C21481-5F85-A253-0DE7-C0905EC7F8E2}"/>
+            </a:ext>
+          </a:extLst>
+        </p:cNvPr>
+        <p:cNvGrpSpPr/>
+        <p:nvPr/>
+      </p:nvGrpSpPr>
+      <p:grpSpPr>
+        <a:xfrm>
+          <a:off x="0" y="0"/>
+          <a:ext cx="0" cy="0"/>
+          <a:chOff x="0" y="0"/>
+          <a:chExt cx="0" cy="0"/>
+        </a:xfrm>
+      </p:grpSpPr>
+      <p:sp>
+        <p:nvSpPr>
+          <p:cNvPr id="2" name="Title 1">
+            <a:extLst>
+              <a:ext uri="{FF2B5EF4-FFF2-40B4-BE49-F238E27FC236}">
+                <a16:creationId xmlns:a16="http://schemas.microsoft.com/office/drawing/2014/main" id="{7962EB26-B2BE-5022-89D5-C3A8AE69B314}"/>
+              </a:ext>
+            </a:extLst>
+          </p:cNvPr>
+          <p:cNvSpPr>
+            <a:spLocks noGrp="1"/>
+          </p:cNvSpPr>
+          <p:nvPr>
+            <p:ph type="title"/>
+          </p:nvPr>
+        </p:nvSpPr>
+        <p:spPr/>
+        <p:txBody>
+          <a:bodyPr/>
+          <a:lstStyle/>
+          <a:p>
+            <a:r>
+              <a:rPr lang="en-US" sz="3600" dirty="0"/>
+              <a:t>Sequences</a:t>
+            </a:r>
+          </a:p>
+        </p:txBody>
+      </p:sp>
+      <p:sp>
+        <p:nvSpPr>
+          <p:cNvPr id="128" name="Slide Number Placeholder 127">
+            <a:extLst>
+              <a:ext uri="{FF2B5EF4-FFF2-40B4-BE49-F238E27FC236}">
+                <a16:creationId xmlns:a16="http://schemas.microsoft.com/office/drawing/2014/main" id="{671C5B71-2F06-F134-37F1-9B00DD993693}"/>
+              </a:ext>
+            </a:extLst>
+          </p:cNvPr>
+          <p:cNvSpPr>
+            <a:spLocks noGrp="1"/>
+          </p:cNvSpPr>
+          <p:nvPr>
+            <p:ph type="sldNum" sz="quarter" idx="11"/>
+          </p:nvPr>
+        </p:nvSpPr>
+        <p:spPr/>
+        <p:txBody>
+          <a:bodyPr/>
+          <a:lstStyle/>
+          <a:p>
+            <a:pPr>
+              <a:defRPr/>
+            </a:pPr>
+            <a:fld id="{6E0AA622-F4CE-604D-A669-CD3D12FC535C}" type="slidenum">
+              <a:rPr lang="en-US" smtClean="0"/>
+              <a:pPr>
+                <a:defRPr/>
+              </a:pPr>
+              <a:t>5</a:t>
+            </a:fld>
+            <a:endParaRPr lang="en-US" dirty="0"/>
+          </a:p>
+        </p:txBody>
+      </p:sp>
+      <p:sp>
+        <p:nvSpPr>
+          <p:cNvPr id="3" name="TextBox 2">
+            <a:extLst>
+              <a:ext uri="{FF2B5EF4-FFF2-40B4-BE49-F238E27FC236}">
+                <a16:creationId xmlns:a16="http://schemas.microsoft.com/office/drawing/2014/main" id="{16EADAB8-361C-D003-144F-DABFA318F028}"/>
+              </a:ext>
+            </a:extLst>
+          </p:cNvPr>
+          <p:cNvSpPr txBox="1"/>
+          <p:nvPr/>
+        </p:nvSpPr>
+        <p:spPr>
+          <a:xfrm>
+            <a:off x="381000" y="1158925"/>
+            <a:ext cx="8016766" cy="338554"/>
+          </a:xfrm>
+          <a:prstGeom prst="rect">
+            <a:avLst/>
+          </a:prstGeom>
+          <a:gradFill flip="none" rotWithShape="1">
+            <a:gsLst>
+              <a:gs pos="0">
+                <a:schemeClr val="bg1"/>
+              </a:gs>
+              <a:gs pos="74000">
+                <a:srgbClr val="FFE267"/>
+              </a:gs>
+              <a:gs pos="83000">
+                <a:srgbClr val="FFE267"/>
+              </a:gs>
+              <a:gs pos="100000">
+                <a:srgbClr val="FFE267"/>
+              </a:gs>
+            </a:gsLst>
+            <a:lin ang="10800000" scaled="1"/>
+            <a:tileRect/>
+          </a:gradFill>
+        </p:spPr>
+        <p:txBody>
+          <a:bodyPr wrap="square" rtlCol="0">
+            <a:spAutoFit/>
+          </a:bodyPr>
+          <a:lstStyle/>
+          <a:p>
+            <a:r>
+              <a:rPr lang="en-US" sz="1600" dirty="0"/>
+              <a:t>Sequence and Quantification Example</a:t>
+            </a:r>
+          </a:p>
+        </p:txBody>
+      </p:sp>
+      <p:pic>
+        <p:nvPicPr>
+          <p:cNvPr id="5" name="Picture 4" descr="A screenshot of a computer code&#10;&#10;Description automatically generated">
+            <a:extLst>
+              <a:ext uri="{FF2B5EF4-FFF2-40B4-BE49-F238E27FC236}">
+                <a16:creationId xmlns:a16="http://schemas.microsoft.com/office/drawing/2014/main" id="{F6C4E10F-17FD-BD2C-936D-135FD471723F}"/>
+              </a:ext>
+            </a:extLst>
+          </p:cNvPr>
+          <p:cNvPicPr>
+            <a:picLocks noChangeAspect="1"/>
+          </p:cNvPicPr>
+          <p:nvPr/>
+        </p:nvPicPr>
+        <p:blipFill>
+          <a:blip r:embed="rId3"/>
+          <a:stretch>
+            <a:fillRect/>
+          </a:stretch>
+        </p:blipFill>
+        <p:spPr>
+          <a:xfrm>
+            <a:off x="533400" y="2209800"/>
+            <a:ext cx="7112000" cy="3860800"/>
+          </a:xfrm>
+          <a:prstGeom prst="rect">
+            <a:avLst/>
+          </a:prstGeom>
+        </p:spPr>
+      </p:pic>
+      <p:sp>
+        <p:nvSpPr>
+          <p:cNvPr id="6" name="TextBox 5">
+            <a:extLst>
+              <a:ext uri="{FF2B5EF4-FFF2-40B4-BE49-F238E27FC236}">
+                <a16:creationId xmlns:a16="http://schemas.microsoft.com/office/drawing/2014/main" id="{6B7B3674-E5CD-375E-AFA2-B4C5511E4886}"/>
+              </a:ext>
+            </a:extLst>
+          </p:cNvPr>
+          <p:cNvSpPr txBox="1"/>
+          <p:nvPr/>
+        </p:nvSpPr>
+        <p:spPr>
+          <a:xfrm>
+            <a:off x="533400" y="1809690"/>
+            <a:ext cx="6105967" cy="400110"/>
+          </a:xfrm>
+          <a:prstGeom prst="rect">
+            <a:avLst/>
+          </a:prstGeom>
+          <a:noFill/>
+        </p:spPr>
+        <p:txBody>
+          <a:bodyPr wrap="none" rtlCol="0">
+            <a:spAutoFit/>
+          </a:bodyPr>
+          <a:lstStyle/>
+          <a:p>
+            <a:r>
+              <a:rPr lang="en-GB" sz="2000" dirty="0">
+                <a:solidFill>
+                  <a:srgbClr val="8922FD"/>
+                </a:solidFill>
+              </a:rPr>
+              <a:t>Function filling a mutable sequence with the identity</a:t>
+            </a:r>
+          </a:p>
+        </p:txBody>
+      </p:sp>
+    </p:spTree>
+    <p:extLst>
+      <p:ext uri="{BB962C8B-B14F-4D97-AF65-F5344CB8AC3E}">
+        <p14:creationId xmlns:p14="http://schemas.microsoft.com/office/powerpoint/2010/main" val="3232215184"/>
+      </p:ext>
+    </p:extLst>
+  </p:cSld>
+  <p:clrMapOvr>
+    <a:masterClrMapping/>
+  </p:clrMapOvr>
+</p:sld>
+</file>
+
+<file path=ppt/slides/slide6.xml><?xml version="1.0" encoding="utf-8"?>
+<p:sld xmlns:a="http://schemas.openxmlformats.org/drawingml/2006/main" xmlns:r="http://schemas.openxmlformats.org/officeDocument/2006/relationships" xmlns:p="http://schemas.openxmlformats.org/presentationml/2006/main">
+  <p:cSld>
+    <p:spTree>
+      <p:nvGrpSpPr>
+        <p:cNvPr id="1" name="">
+          <a:extLst>
+            <a:ext uri="{FF2B5EF4-FFF2-40B4-BE49-F238E27FC236}">
+              <a16:creationId xmlns:a16="http://schemas.microsoft.com/office/drawing/2014/main" id="{2AF12B16-ADB3-C7EE-FA41-56F71493788C}"/>
+            </a:ext>
+          </a:extLst>
+        </p:cNvPr>
+        <p:cNvGrpSpPr/>
+        <p:nvPr/>
+      </p:nvGrpSpPr>
+      <p:grpSpPr>
+        <a:xfrm>
+          <a:off x="0" y="0"/>
+          <a:ext cx="0" cy="0"/>
+          <a:chOff x="0" y="0"/>
+          <a:chExt cx="0" cy="0"/>
+        </a:xfrm>
+      </p:grpSpPr>
+      <p:sp>
+        <p:nvSpPr>
+          <p:cNvPr id="2" name="Title 1">
+            <a:extLst>
+              <a:ext uri="{FF2B5EF4-FFF2-40B4-BE49-F238E27FC236}">
+                <a16:creationId xmlns:a16="http://schemas.microsoft.com/office/drawing/2014/main" id="{0344E115-7BC6-1648-7903-767C333FC56A}"/>
+              </a:ext>
+            </a:extLst>
+          </p:cNvPr>
+          <p:cNvSpPr>
+            <a:spLocks noGrp="1"/>
+          </p:cNvSpPr>
+          <p:nvPr>
+            <p:ph type="title"/>
+          </p:nvPr>
+        </p:nvSpPr>
+        <p:spPr/>
+        <p:txBody>
+          <a:bodyPr/>
+          <a:lstStyle/>
+          <a:p>
+            <a:r>
+              <a:rPr lang="en-US" sz="3600" dirty="0"/>
+              <a:t>Sequences</a:t>
+            </a:r>
+          </a:p>
+        </p:txBody>
+      </p:sp>
+      <p:sp>
+        <p:nvSpPr>
+          <p:cNvPr id="128" name="Slide Number Placeholder 127">
+            <a:extLst>
+              <a:ext uri="{FF2B5EF4-FFF2-40B4-BE49-F238E27FC236}">
+                <a16:creationId xmlns:a16="http://schemas.microsoft.com/office/drawing/2014/main" id="{6A314EE0-5305-AEC8-9808-DDA4D1621890}"/>
+              </a:ext>
+            </a:extLst>
+          </p:cNvPr>
+          <p:cNvSpPr>
+            <a:spLocks noGrp="1"/>
+          </p:cNvSpPr>
+          <p:nvPr>
+            <p:ph type="sldNum" sz="quarter" idx="11"/>
+          </p:nvPr>
+        </p:nvSpPr>
+        <p:spPr/>
+        <p:txBody>
+          <a:bodyPr/>
+          <a:lstStyle/>
+          <a:p>
+            <a:pPr>
+              <a:defRPr/>
+            </a:pPr>
+            <a:fld id="{6E0AA622-F4CE-604D-A669-CD3D12FC535C}" type="slidenum">
+              <a:rPr lang="en-US" smtClean="0"/>
+              <a:pPr>
+                <a:defRPr/>
+              </a:pPr>
+              <a:t>6</a:t>
+            </a:fld>
+            <a:endParaRPr lang="en-US" dirty="0"/>
+          </a:p>
+        </p:txBody>
+      </p:sp>
+      <p:sp>
+        <p:nvSpPr>
+          <p:cNvPr id="3" name="TextBox 2">
+            <a:extLst>
+              <a:ext uri="{FF2B5EF4-FFF2-40B4-BE49-F238E27FC236}">
+                <a16:creationId xmlns:a16="http://schemas.microsoft.com/office/drawing/2014/main" id="{D7009A22-AA09-FFBA-8BFF-EAAF89F9B16A}"/>
+              </a:ext>
+            </a:extLst>
+          </p:cNvPr>
+          <p:cNvSpPr txBox="1"/>
+          <p:nvPr/>
+        </p:nvSpPr>
+        <p:spPr>
+          <a:xfrm>
+            <a:off x="381000" y="1158925"/>
+            <a:ext cx="8016766" cy="338554"/>
+          </a:xfrm>
+          <a:prstGeom prst="rect">
+            <a:avLst/>
+          </a:prstGeom>
+          <a:gradFill flip="none" rotWithShape="1">
+            <a:gsLst>
+              <a:gs pos="0">
+                <a:schemeClr val="bg1"/>
+              </a:gs>
+              <a:gs pos="74000">
+                <a:srgbClr val="FFE267"/>
+              </a:gs>
+              <a:gs pos="83000">
+                <a:srgbClr val="FFE267"/>
+              </a:gs>
+              <a:gs pos="100000">
+                <a:srgbClr val="FFE267"/>
+              </a:gs>
+            </a:gsLst>
+            <a:lin ang="10800000" scaled="1"/>
+            <a:tileRect/>
+          </a:gradFill>
+        </p:spPr>
+        <p:txBody>
+          <a:bodyPr wrap="square" rtlCol="0">
+            <a:spAutoFit/>
+          </a:bodyPr>
+          <a:lstStyle/>
+          <a:p>
+            <a:r>
+              <a:rPr lang="en-US" sz="1600" dirty="0"/>
+              <a:t>Quantification</a:t>
+            </a:r>
+          </a:p>
+        </p:txBody>
+      </p:sp>
+    </p:spTree>
+    <p:extLst>
+      <p:ext uri="{BB962C8B-B14F-4D97-AF65-F5344CB8AC3E}">
+        <p14:creationId xmlns:p14="http://schemas.microsoft.com/office/powerpoint/2010/main" val="3839819333"/>
       </p:ext>
     </p:extLst>
   </p:cSld>

</xml_diff>

<commit_message>
More slides for M2, selection sort
</commit_message>
<xml_diff>
--- a/slides/M-02-02-Sequences-Quantification.pptx
+++ b/slides/M-02-02-Sequences-Quantification.pptx
@@ -8313,11 +8313,41 @@
           <a:p>
             <a:r>
               <a:rPr lang="en-US" sz="1600" dirty="0"/>
-              <a:t>Quantification</a:t>
-            </a:r>
-          </a:p>
-        </p:txBody>
-      </p:sp>
+              <a:t>Find (stable) minimum in sequence of numbers</a:t>
+            </a:r>
+          </a:p>
+        </p:txBody>
+      </p:sp>
+      <p:pic>
+        <p:nvPicPr>
+          <p:cNvPr id="5" name="Picture 4" descr="A screenshot of a computer program&#10;&#10;Description automatically generated">
+            <a:extLst>
+              <a:ext uri="{FF2B5EF4-FFF2-40B4-BE49-F238E27FC236}">
+                <a16:creationId xmlns:a16="http://schemas.microsoft.com/office/drawing/2014/main" id="{BE6906E4-4044-29B5-2A36-B32B7F322F3D}"/>
+              </a:ext>
+            </a:extLst>
+          </p:cNvPr>
+          <p:cNvPicPr>
+            <a:picLocks noChangeAspect="1"/>
+          </p:cNvPicPr>
+          <p:nvPr/>
+        </p:nvPicPr>
+        <p:blipFill>
+          <a:blip r:embed="rId3"/>
+          <a:stretch>
+            <a:fillRect/>
+          </a:stretch>
+        </p:blipFill>
+        <p:spPr>
+          <a:xfrm>
+            <a:off x="625366" y="1537649"/>
+            <a:ext cx="7772400" cy="5276263"/>
+          </a:xfrm>
+          <a:prstGeom prst="rect">
+            <a:avLst/>
+          </a:prstGeom>
+        </p:spPr>
+      </p:pic>
     </p:spTree>
     <p:extLst>
       <p:ext uri="{BB962C8B-B14F-4D97-AF65-F5344CB8AC3E}">

</xml_diff>